<commit_message>
2025-01-26 23:53 집에서 커밋
</commit_message>
<xml_diff>
--- a/정현민 화면구현_포트폴리오 PPT.pptx
+++ b/정현민 화면구현_포트폴리오 PPT.pptx
@@ -5,14 +5,13 @@
     <p:sldMasterId id="2147483662" r:id="rId1"/>
   </p:sldMasterIdLst>
   <p:notesMasterIdLst>
-    <p:notesMasterId r:id="rId7"/>
+    <p:notesMasterId r:id="rId6"/>
   </p:notesMasterIdLst>
   <p:sldIdLst>
     <p:sldId id="257" r:id="rId2"/>
     <p:sldId id="263" r:id="rId3"/>
-    <p:sldId id="274" r:id="rId4"/>
-    <p:sldId id="265" r:id="rId5"/>
-    <p:sldId id="267" r:id="rId6"/>
+    <p:sldId id="265" r:id="rId4"/>
+    <p:sldId id="267" r:id="rId5"/>
   </p:sldIdLst>
   <p:sldSz cx="9144000" cy="5143500" type="screen16x9"/>
   <p:notesSz cx="6858000" cy="9144000"/>
@@ -793,19 +792,19 @@
             </a:pPr>
             <a:r>
               <a:rPr lang="ko-KR" altLang="en-US"/>
-              <a:t>위 이미지를 복사</a:t>
+              <a:t>중앙 동그라미 안에 숫자 대신 핵심 단어를 적어도 좋습니다</a:t>
             </a:r>
             <a:r>
               <a:rPr lang="en-US" altLang="ko-KR"/>
-              <a:t>, </a:t>
+              <a:t>. (</a:t>
             </a:r>
             <a:r>
               <a:rPr lang="ko-KR" altLang="en-US"/>
-              <a:t>붙여넣기 하여 자유롭게 레이아웃을 만들어 사용해도 좋습니다</a:t>
+              <a:t>단어가 길다면 동그라미 크기 내에서 폰트 사이즈를 줄여도 좋습니다</a:t>
             </a:r>
             <a:r>
               <a:rPr lang="en-US" altLang="ko-KR"/>
-              <a:t>.</a:t>
+              <a:t>.)</a:t>
             </a:r>
             <a:endParaRPr lang="ko-KR" altLang="en-US"/>
           </a:p>
@@ -834,111 +833,7 @@
               <a:pPr lvl="0">
                 <a:defRPr lang="ko-KR" altLang="en-US"/>
               </a:pPr>
-              <a:t>3</a:t>
-            </a:fld>
-            <a:endParaRPr lang="en-US" altLang="en-US"/>
-          </a:p>
-        </p:txBody>
-      </p:sp>
-    </p:spTree>
-  </p:cSld>
-  <p:clrMapOvr>
-    <a:masterClrMapping/>
-  </p:clrMapOvr>
-</p:notes>
-</file>
-
-<file path=ppt/notesSlides/notesSlide4.xml><?xml version="1.0" encoding="utf-8"?>
-<p:notes xmlns:a="http://schemas.openxmlformats.org/drawingml/2006/main" xmlns:r="http://schemas.openxmlformats.org/officeDocument/2006/relationships" xmlns:p="http://schemas.openxmlformats.org/presentationml/2006/main">
-  <p:cSld>
-    <p:spTree>
-      <p:nvGrpSpPr>
-        <p:cNvPr id="1" name=""/>
-        <p:cNvGrpSpPr/>
-        <p:nvPr/>
-      </p:nvGrpSpPr>
-      <p:grpSpPr>
-        <a:xfrm>
-          <a:off x="0" y="0"/>
-          <a:ext cx="0" cy="0"/>
-          <a:chOff x="0" y="0"/>
-          <a:chExt cx="0" cy="0"/>
-        </a:xfrm>
-      </p:grpSpPr>
-      <p:sp>
-        <p:nvSpPr>
-          <p:cNvPr id="2" name="슬라이드 이미지 개체 틀 1"/>
-          <p:cNvSpPr>
-            <a:spLocks noGrp="1" noRot="1" noChangeAspect="1" noTextEdit="1"/>
-          </p:cNvSpPr>
-          <p:nvPr>
-            <p:ph type="sldImg"/>
-          </p:nvPr>
-        </p:nvSpPr>
-        <p:spPr/>
-      </p:sp>
-      <p:sp>
-        <p:nvSpPr>
-          <p:cNvPr id="3" name="슬라이드 노트 개체 틀 2"/>
-          <p:cNvSpPr>
-            <a:spLocks noGrp="1"/>
-          </p:cNvSpPr>
-          <p:nvPr>
-            <p:ph type="body" idx="1"/>
-          </p:nvPr>
-        </p:nvSpPr>
-        <p:spPr/>
-        <p:txBody>
-          <a:bodyPr/>
-          <a:lstStyle/>
-          <a:p>
-            <a:pPr lvl="0">
-              <a:defRPr lang="ko-KR" altLang="en-US"/>
-            </a:pPr>
-            <a:r>
-              <a:rPr lang="ko-KR" altLang="en-US"/>
-              <a:t>중앙 동그라미 안에 숫자 대신 핵심 단어를 적어도 좋습니다</a:t>
-            </a:r>
-            <a:r>
-              <a:rPr lang="en-US" altLang="ko-KR"/>
-              <a:t>. (</a:t>
-            </a:r>
-            <a:r>
-              <a:rPr lang="ko-KR" altLang="en-US"/>
-              <a:t>단어가 길다면 동그라미 크기 내에서 폰트 사이즈를 줄여도 좋습니다</a:t>
-            </a:r>
-            <a:r>
-              <a:rPr lang="en-US" altLang="ko-KR"/>
-              <a:t>.)</a:t>
-            </a:r>
-            <a:endParaRPr lang="ko-KR" altLang="en-US"/>
-          </a:p>
-        </p:txBody>
-      </p:sp>
-      <p:sp>
-        <p:nvSpPr>
-          <p:cNvPr id="4" name="슬라이드 번호 개체 틀 3"/>
-          <p:cNvSpPr>
-            <a:spLocks noGrp="1"/>
-          </p:cNvSpPr>
-          <p:nvPr>
-            <p:ph type="sldNum" sz="quarter" idx="10"/>
-          </p:nvPr>
-        </p:nvSpPr>
-        <p:spPr/>
-        <p:txBody>
-          <a:bodyPr/>
-          <a:lstStyle/>
-          <a:p>
-            <a:pPr lvl="0">
-              <a:defRPr lang="ko-KR" altLang="en-US"/>
-            </a:pPr>
-            <a:fld id="{0F3B2C96-A795-4D15-8CDE-BED0B3E8A378}" type="slidenum">
-              <a:rPr lang="en-US" altLang="en-US"/>
-              <a:pPr lvl="0">
-                <a:defRPr lang="ko-KR" altLang="en-US"/>
-              </a:pPr>
-              <a:t>5</a:t>
+              <a:t>4</a:t>
             </a:fld>
             <a:endParaRPr lang="en-US" altLang="en-US"/>
           </a:p>
@@ -4063,7 +3958,7 @@
         <p:spPr>
           <a:xfrm>
             <a:off x="539552" y="483518"/>
-            <a:ext cx="2649380" cy="400110"/>
+            <a:ext cx="2816797" cy="400110"/>
           </a:xfrm>
           <a:prstGeom prst="rect">
             <a:avLst/>
@@ -4077,14 +3972,14 @@
           <a:lstStyle/>
           <a:p>
             <a:r>
-              <a:rPr lang="ko-KR" altLang="en-US" sz="2000" dirty="0">
+              <a:rPr lang="ko-KR" altLang="en-US" sz="2000" dirty="0" smtClean="0">
                 <a:solidFill>
                   <a:schemeClr val="bg1"/>
                 </a:solidFill>
                 <a:latin typeface="G마켓 산스 Bold" pitchFamily="50" charset="-127"/>
                 <a:ea typeface="G마켓 산스 Bold" pitchFamily="50" charset="-127"/>
               </a:rPr>
-              <a:t>화면구현 </a:t>
+              <a:t>화면 구현 </a:t>
             </a:r>
             <a:r>
               <a:rPr lang="en-US" altLang="ko-KR" sz="2000" dirty="0">
@@ -4290,7 +4185,7 @@
     <mc:Choice Requires="p14">
       <p:transition/>
     </mc:Choice>
-    <mc:Fallback xmlns="" xmlns:c="http://schemas.openxmlformats.org/drawingml/2006/chart" xmlns:dgm="http://schemas.openxmlformats.org/drawingml/2006/diagram" xmlns:dsp="http://schemas.microsoft.com/office/drawing/2008/diagram">
+    <mc:Fallback xmlns:dsp="http://schemas.microsoft.com/office/drawing/2008/diagram" xmlns:dgm="http://schemas.openxmlformats.org/drawingml/2006/diagram" xmlns:c="http://schemas.openxmlformats.org/drawingml/2006/chart" xmlns="">
       <p:transition/>
     </mc:Fallback>
   </mc:AlternateContent>
@@ -4372,7 +4267,7 @@
         <p:spPr>
           <a:xfrm>
             <a:off x="467544" y="1919422"/>
-            <a:ext cx="4968552" cy="1958417"/>
+            <a:ext cx="4968552" cy="2308512"/>
           </a:xfrm>
           <a:prstGeom prst="rect">
             <a:avLst/>
@@ -4433,7 +4328,7 @@
         <p:spPr>
           <a:xfrm>
             <a:off x="467544" y="483518"/>
-            <a:ext cx="3177473" cy="523220"/>
+            <a:ext cx="3297698" cy="523220"/>
           </a:xfrm>
           <a:prstGeom prst="rect">
             <a:avLst/>
@@ -4447,7 +4342,7 @@
           <a:lstStyle/>
           <a:p>
             <a:r>
-              <a:rPr lang="ko-KR" altLang="en-US" sz="2800" dirty="0" err="1" smtClean="0">
+              <a:rPr lang="ko-KR" altLang="en-US" sz="2800" dirty="0" smtClean="0">
                 <a:solidFill>
                   <a:schemeClr val="tx2">
                     <a:lumMod val="60000"/>
@@ -4457,20 +4352,7 @@
                 <a:latin typeface="G마켓 산스 Bold" pitchFamily="50" charset="-127"/>
                 <a:ea typeface="G마켓 산스 Bold" pitchFamily="50" charset="-127"/>
               </a:rPr>
-              <a:t>화면구현</a:t>
-            </a:r>
-            <a:r>
-              <a:rPr lang="ko-KR" altLang="en-US" sz="2800" dirty="0" smtClean="0">
-                <a:solidFill>
-                  <a:schemeClr val="tx2">
-                    <a:lumMod val="60000"/>
-                    <a:lumOff val="40000"/>
-                  </a:schemeClr>
-                </a:solidFill>
-                <a:latin typeface="G마켓 산스 Bold" pitchFamily="50" charset="-127"/>
-                <a:ea typeface="G마켓 산스 Bold" pitchFamily="50" charset="-127"/>
-              </a:rPr>
-              <a:t> </a:t>
+              <a:t>화면 구현 </a:t>
             </a:r>
             <a:r>
               <a:rPr lang="ko-KR" altLang="en-US" sz="2800" dirty="0" smtClean="0">
@@ -4690,7 +4572,79 @@
                 <a:latin typeface="G마켓 산스 Medium" pitchFamily="50" charset="-127"/>
                 <a:ea typeface="G마켓 산스 Medium" pitchFamily="50" charset="-127"/>
               </a:rPr>
-              <a:t>애니메이션 및 로그인 등 기타 기능을 모두 포함시켰습니다</a:t>
+              <a:t>애니메이션 및 로그인 등 </a:t>
+            </a:r>
+            <a:r>
+              <a:rPr lang="ko-KR" altLang="en-US" sz="900" dirty="0" smtClean="0">
+                <a:solidFill>
+                  <a:schemeClr val="tx2">
+                    <a:lumMod val="50000"/>
+                  </a:schemeClr>
+                </a:solidFill>
+                <a:latin typeface="G마켓 산스 Medium" pitchFamily="50" charset="-127"/>
+                <a:ea typeface="G마켓 산스 Medium" pitchFamily="50" charset="-127"/>
+              </a:rPr>
+              <a:t>실제 </a:t>
+            </a:r>
+            <a:r>
+              <a:rPr lang="ko-KR" altLang="en-US" sz="900" dirty="0" err="1" smtClean="0">
+                <a:solidFill>
+                  <a:schemeClr val="tx2">
+                    <a:lumMod val="50000"/>
+                  </a:schemeClr>
+                </a:solidFill>
+                <a:latin typeface="G마켓 산스 Medium" pitchFamily="50" charset="-127"/>
+                <a:ea typeface="G마켓 산스 Medium" pitchFamily="50" charset="-127"/>
+              </a:rPr>
+              <a:t>웹페이지</a:t>
+            </a:r>
+            <a:r>
+              <a:rPr lang="ko-KR" altLang="en-US" sz="900" dirty="0" smtClean="0">
+                <a:solidFill>
+                  <a:schemeClr val="tx2">
+                    <a:lumMod val="50000"/>
+                  </a:schemeClr>
+                </a:solidFill>
+                <a:latin typeface="G마켓 산스 Medium" pitchFamily="50" charset="-127"/>
+                <a:ea typeface="G마켓 산스 Medium" pitchFamily="50" charset="-127"/>
+              </a:rPr>
+              <a:t> </a:t>
+            </a:r>
+            <a:r>
+              <a:rPr lang="ko-KR" altLang="en-US" sz="900" dirty="0" smtClean="0">
+                <a:solidFill>
+                  <a:schemeClr val="tx2">
+                    <a:lumMod val="50000"/>
+                  </a:schemeClr>
+                </a:solidFill>
+                <a:latin typeface="G마켓 산스 Medium" pitchFamily="50" charset="-127"/>
+                <a:ea typeface="G마켓 산스 Medium" pitchFamily="50" charset="-127"/>
+              </a:rPr>
+              <a:t>기능을 </a:t>
+            </a:r>
+            <a:r>
+              <a:rPr lang="ko-KR" altLang="en-US" sz="900" dirty="0" smtClean="0">
+                <a:solidFill>
+                  <a:schemeClr val="tx2">
+                    <a:lumMod val="50000"/>
+                  </a:schemeClr>
+                </a:solidFill>
+                <a:latin typeface="G마켓 산스 Medium" pitchFamily="50" charset="-127"/>
+                <a:ea typeface="G마켓 산스 Medium" pitchFamily="50" charset="-127"/>
+              </a:rPr>
+              <a:t>다수 </a:t>
+            </a:r>
+            <a:r>
+              <a:rPr lang="ko-KR" altLang="en-US" sz="900" dirty="0" smtClean="0">
+                <a:solidFill>
+                  <a:schemeClr val="tx2">
+                    <a:lumMod val="50000"/>
+                  </a:schemeClr>
+                </a:solidFill>
+                <a:latin typeface="G마켓 산스 Medium" pitchFamily="50" charset="-127"/>
+                <a:ea typeface="G마켓 산스 Medium" pitchFamily="50" charset="-127"/>
+              </a:rPr>
+              <a:t>포함시켰습니다</a:t>
             </a:r>
             <a:r>
               <a:rPr lang="en-US" altLang="ko-KR" sz="900" dirty="0" smtClean="0">
@@ -4724,7 +4678,7 @@
         </p:nvSpPr>
         <p:spPr>
           <a:xfrm>
-            <a:off x="467544" y="4083828"/>
+            <a:off x="467544" y="4371950"/>
             <a:ext cx="4989200" cy="288032"/>
           </a:xfrm>
           <a:prstGeom prst="roundRect">
@@ -4773,8 +4727,8 @@
         </p:nvSpPr>
         <p:spPr>
           <a:xfrm>
-            <a:off x="506732" y="4063773"/>
-            <a:ext cx="2323072" cy="323165"/>
+            <a:off x="506733" y="4351895"/>
+            <a:ext cx="4929364" cy="267766"/>
           </a:xfrm>
           <a:prstGeom prst="rect">
             <a:avLst/>
@@ -4782,7 +4736,7 @@
           <a:noFill/>
         </p:spPr>
         <p:txBody>
-          <a:bodyPr wrap="none" rtlCol="0">
+          <a:bodyPr wrap="square" rtlCol="0">
             <a:spAutoFit/>
           </a:bodyPr>
           <a:lstStyle/>
@@ -4793,7 +4747,7 @@
               </a:lnSpc>
             </a:pPr>
             <a:r>
-              <a:rPr lang="ko-KR" altLang="en-US" sz="1000" dirty="0" err="1">
+              <a:rPr lang="ko-KR" altLang="en-US" sz="900" dirty="0" err="1">
                 <a:solidFill>
                   <a:schemeClr val="tx2">
                     <a:lumMod val="50000"/>
@@ -4805,7 +4759,7 @@
               <a:t>깃허브</a:t>
             </a:r>
             <a:r>
-              <a:rPr lang="ko-KR" altLang="en-US" sz="1000" dirty="0">
+              <a:rPr lang="ko-KR" altLang="en-US" sz="900" dirty="0">
                 <a:solidFill>
                   <a:schemeClr val="tx2">
                     <a:lumMod val="50000"/>
@@ -4817,7 +4771,7 @@
               <a:t> 링크 </a:t>
             </a:r>
             <a:r>
-              <a:rPr lang="en-US" altLang="ko-KR" sz="1000" dirty="0">
+              <a:rPr lang="en-US" altLang="ko-KR" sz="900" dirty="0">
                 <a:solidFill>
                   <a:schemeClr val="tx2">
                     <a:lumMod val="50000"/>
@@ -4826,89 +4780,10 @@
                 <a:latin typeface="G마켓 산스 Medium" pitchFamily="50" charset="-127"/>
                 <a:ea typeface="G마켓 산스 Medium" pitchFamily="50" charset="-127"/>
               </a:rPr>
-              <a:t>: https://github.com/</a:t>
-            </a:r>
-          </a:p>
-        </p:txBody>
-      </p:sp>
-      <p:sp>
-        <p:nvSpPr>
-          <p:cNvPr id="23" name="모서리가 둥근 직사각형 22"/>
-          <p:cNvSpPr/>
-          <p:nvPr/>
-        </p:nvSpPr>
-        <p:spPr>
-          <a:xfrm>
-            <a:off x="467544" y="4443868"/>
-            <a:ext cx="4989200" cy="288032"/>
-          </a:xfrm>
-          <a:prstGeom prst="roundRect">
-            <a:avLst/>
-          </a:prstGeom>
-          <a:solidFill>
-            <a:schemeClr val="accent6">
-              <a:lumMod val="20000"/>
-              <a:lumOff val="80000"/>
-            </a:schemeClr>
-          </a:solidFill>
-          <a:ln>
-            <a:noFill/>
-          </a:ln>
-        </p:spPr>
-        <p:style>
-          <a:lnRef idx="2">
-            <a:schemeClr val="accent1">
-              <a:shade val="50000"/>
-            </a:schemeClr>
-          </a:lnRef>
-          <a:fillRef idx="1">
-            <a:schemeClr val="accent1"/>
-          </a:fillRef>
-          <a:effectRef idx="0">
-            <a:schemeClr val="accent1"/>
-          </a:effectRef>
-          <a:fontRef idx="minor">
-            <a:schemeClr val="lt1"/>
-          </a:fontRef>
-        </p:style>
-        <p:txBody>
-          <a:bodyPr rtlCol="0" anchor="ctr"/>
-          <a:lstStyle/>
-          <a:p>
-            <a:pPr algn="ctr"/>
-            <a:endParaRPr lang="ko-KR" altLang="en-US"/>
-          </a:p>
-        </p:txBody>
-      </p:sp>
-      <p:sp>
-        <p:nvSpPr>
-          <p:cNvPr id="24" name="TextBox 23"/>
-          <p:cNvSpPr txBox="1"/>
-          <p:nvPr/>
-        </p:nvSpPr>
-        <p:spPr>
-          <a:xfrm>
-            <a:off x="506732" y="4423813"/>
-            <a:ext cx="2358338" cy="323165"/>
-          </a:xfrm>
-          <a:prstGeom prst="rect">
-            <a:avLst/>
-          </a:prstGeom>
-          <a:noFill/>
-        </p:spPr>
-        <p:txBody>
-          <a:bodyPr wrap="none" rtlCol="0">
-            <a:spAutoFit/>
-          </a:bodyPr>
-          <a:lstStyle/>
-          <a:p>
-            <a:pPr>
-              <a:lnSpc>
-                <a:spcPct val="150000"/>
-              </a:lnSpc>
-            </a:pPr>
-            <a:r>
-              <a:rPr lang="ko-KR" altLang="en-US" sz="1000" dirty="0">
+              <a:t>: </a:t>
+            </a:r>
+            <a:r>
+              <a:rPr lang="en-US" altLang="ko-KR" sz="900" dirty="0">
                 <a:solidFill>
                   <a:schemeClr val="tx2">
                     <a:lumMod val="50000"/>
@@ -4917,20 +4792,17 @@
                 <a:latin typeface="G마켓 산스 Medium" pitchFamily="50" charset="-127"/>
                 <a:ea typeface="G마켓 산스 Medium" pitchFamily="50" charset="-127"/>
               </a:rPr>
-              <a:t>서비스 링크 </a:t>
-            </a:r>
-            <a:r>
-              <a:rPr lang="en-US" altLang="ko-KR" sz="1000" dirty="0">
-                <a:solidFill>
-                  <a:schemeClr val="tx2">
-                    <a:lumMod val="50000"/>
-                  </a:schemeClr>
-                </a:solidFill>
-                <a:latin typeface="G마켓 산스 Medium" pitchFamily="50" charset="-127"/>
-                <a:ea typeface="G마켓 산스 Medium" pitchFamily="50" charset="-127"/>
-              </a:rPr>
-              <a:t>: https://github.com/</a:t>
-            </a:r>
+              <a:t>https://github.com/BosuMamemon/Screen_Implementation_Portfolio.git</a:t>
+            </a:r>
+            <a:endParaRPr lang="en-US" altLang="ko-KR" sz="900" dirty="0">
+              <a:solidFill>
+                <a:schemeClr val="tx2">
+                  <a:lumMod val="50000"/>
+                </a:schemeClr>
+              </a:solidFill>
+              <a:latin typeface="G마켓 산스 Medium" pitchFamily="50" charset="-127"/>
+              <a:ea typeface="G마켓 산스 Medium" pitchFamily="50" charset="-127"/>
+            </a:endParaRPr>
           </a:p>
         </p:txBody>
       </p:sp>
@@ -4993,7 +4865,7 @@
         <p:spPr>
           <a:xfrm>
             <a:off x="6138206" y="803451"/>
-            <a:ext cx="2816797" cy="276999"/>
+            <a:ext cx="2850460" cy="276999"/>
           </a:xfrm>
           <a:prstGeom prst="rect">
             <a:avLst/>
@@ -5062,7 +4934,7 @@
               <a:t>개인 </a:t>
             </a:r>
             <a:r>
-              <a:rPr lang="ko-KR" altLang="en-US" sz="800" dirty="0" err="1" smtClean="0">
+              <a:rPr lang="ko-KR" altLang="en-US" sz="800" dirty="0" smtClean="0">
                 <a:solidFill>
                   <a:schemeClr val="tx2">
                     <a:lumMod val="50000"/>
@@ -5071,7 +4943,7 @@
                 <a:latin typeface="G마켓 산스 Medium" pitchFamily="50" charset="-127"/>
                 <a:ea typeface="G마켓 산스 Medium" pitchFamily="50" charset="-127"/>
               </a:rPr>
-              <a:t>화면구현</a:t>
+              <a:t>화면 구현 </a:t>
             </a:r>
             <a:r>
               <a:rPr lang="ko-KR" altLang="en-US" sz="800" dirty="0" smtClean="0">
@@ -5083,7 +4955,7 @@
                 <a:latin typeface="G마켓 산스 Medium" pitchFamily="50" charset="-127"/>
                 <a:ea typeface="G마켓 산스 Medium" pitchFamily="50" charset="-127"/>
               </a:rPr>
-              <a:t> 프로젝트</a:t>
+              <a:t>프로젝트</a:t>
             </a:r>
             <a:endParaRPr lang="en-US" altLang="ko-KR" sz="800" dirty="0" smtClean="0">
               <a:solidFill>
@@ -5682,61 +5554,33 @@
           <a:chExt cx="0" cy="0"/>
         </a:xfrm>
       </p:grpSpPr>
-      <p:pic>
-        <p:nvPicPr>
-          <p:cNvPr id="4" name="Picture 2" descr="C:\Users\User\Desktop\컴퓨터-이미지.png"/>
-          <p:cNvPicPr>
-            <a:picLocks noChangeAspect="1" noChangeArrowheads="1"/>
-          </p:cNvPicPr>
+      <p:sp>
+        <p:nvSpPr>
+          <p:cNvPr id="6" name="직사각형 5"/>
+          <p:cNvSpPr/>
           <p:nvPr/>
-        </p:nvPicPr>
-        <p:blipFill>
-          <a:blip r:embed="rId3">
-            <a:extLst>
-              <a:ext uri="{28A0092B-C50C-407E-A947-70E740481C1C}">
-                <a14:useLocalDpi xmlns:a14="http://schemas.microsoft.com/office/drawing/2010/main" val="0"/>
-              </a:ext>
-            </a:extLst>
-          </a:blip>
-          <a:srcRect/>
-          <a:stretch>
-            <a:fillRect/>
-          </a:stretch>
-        </p:blipFill>
-        <p:spPr bwMode="auto">
+        </p:nvSpPr>
+        <p:spPr>
           <a:xfrm>
-            <a:off x="251520" y="202324"/>
-            <a:ext cx="5688632" cy="5275705"/>
+            <a:off x="0" y="525871"/>
+            <a:ext cx="2880320" cy="1680187"/>
           </a:xfrm>
           <a:prstGeom prst="rect">
             <a:avLst/>
           </a:prstGeom>
-          <a:noFill/>
-          <a:extLst>
-            <a:ext uri="{909E8E84-426E-40DD-AFC4-6F175D3DCCD1}">
-              <a14:hiddenFill xmlns:a14="http://schemas.microsoft.com/office/drawing/2010/main">
-                <a:solidFill>
-                  <a:srgbClr val="FFFFFF"/>
-                </a:solidFill>
-              </a14:hiddenFill>
-            </a:ext>
-          </a:extLst>
-        </p:spPr>
-      </p:pic>
-      <p:sp>
-        <p:nvSpPr>
-          <p:cNvPr id="5" name="직사각형 4"/>
-          <p:cNvSpPr/>
-          <p:nvPr/>
-        </p:nvSpPr>
-        <p:spPr>
-          <a:xfrm>
-            <a:off x="539552" y="542954"/>
-            <a:ext cx="5112568" cy="3062818"/>
-          </a:xfrm>
-          <a:prstGeom prst="rect">
-            <a:avLst/>
-          </a:prstGeom>
+          <a:blipFill dpi="0" rotWithShape="1">
+            <a:blip r:embed="rId2" cstate="print">
+              <a:extLst>
+                <a:ext uri="{28A0092B-C50C-407E-A947-70E740481C1C}">
+                  <a14:useLocalDpi xmlns:a14="http://schemas.microsoft.com/office/drawing/2010/main" val="0"/>
+                </a:ext>
+              </a:extLst>
+            </a:blip>
+            <a:srcRect/>
+            <a:stretch>
+              <a:fillRect/>
+            </a:stretch>
+          </a:blipFill>
           <a:ln>
             <a:noFill/>
           </a:ln>
@@ -5762,57 +5606,37 @@
           <a:lstStyle/>
           <a:p>
             <a:pPr algn="ctr"/>
-            <a:r>
-              <a:rPr lang="ko-KR" altLang="en-US" dirty="0"/>
-              <a:t>웹 이미지</a:t>
-            </a:r>
-          </a:p>
-        </p:txBody>
-      </p:sp>
-    </p:spTree>
-    <p:extLst>
-      <p:ext uri="{BB962C8B-B14F-4D97-AF65-F5344CB8AC3E}">
-        <p14:creationId xmlns:p14="http://schemas.microsoft.com/office/powerpoint/2010/main" val="3291752082"/>
-      </p:ext>
-    </p:extLst>
-  </p:cSld>
-  <p:clrMapOvr>
-    <a:masterClrMapping/>
-  </p:clrMapOvr>
-</p:sld>
-</file>
-
-<file path=ppt/slides/slide4.xml><?xml version="1.0" encoding="utf-8"?>
-<p:sld xmlns:a="http://schemas.openxmlformats.org/drawingml/2006/main" xmlns:r="http://schemas.openxmlformats.org/officeDocument/2006/relationships" xmlns:p="http://schemas.openxmlformats.org/presentationml/2006/main">
-  <p:cSld>
-    <p:spTree>
-      <p:nvGrpSpPr>
-        <p:cNvPr id="1" name=""/>
-        <p:cNvGrpSpPr/>
-        <p:nvPr/>
-      </p:nvGrpSpPr>
-      <p:grpSpPr>
-        <a:xfrm>
-          <a:off x="0" y="0"/>
-          <a:ext cx="0" cy="0"/>
-          <a:chOff x="0" y="0"/>
-          <a:chExt cx="0" cy="0"/>
-        </a:xfrm>
-      </p:grpSpPr>
-      <p:sp>
-        <p:nvSpPr>
-          <p:cNvPr id="6" name="직사각형 5"/>
+            <a:endParaRPr lang="ko-KR" altLang="en-US" dirty="0"/>
+          </a:p>
+        </p:txBody>
+      </p:sp>
+      <p:sp>
+        <p:nvSpPr>
+          <p:cNvPr id="8" name="직사각형 7"/>
           <p:cNvSpPr/>
           <p:nvPr/>
         </p:nvSpPr>
         <p:spPr>
           <a:xfrm>
-            <a:off x="0" y="525871"/>
+            <a:off x="3131840" y="525871"/>
             <a:ext cx="2880320" cy="1680187"/>
           </a:xfrm>
           <a:prstGeom prst="rect">
             <a:avLst/>
           </a:prstGeom>
+          <a:blipFill dpi="0" rotWithShape="1">
+            <a:blip r:embed="rId3" cstate="print">
+              <a:extLst>
+                <a:ext uri="{28A0092B-C50C-407E-A947-70E740481C1C}">
+                  <a14:useLocalDpi xmlns:a14="http://schemas.microsoft.com/office/drawing/2010/main" val="0"/>
+                </a:ext>
+              </a:extLst>
+            </a:blip>
+            <a:srcRect/>
+            <a:stretch>
+              <a:fillRect/>
+            </a:stretch>
+          </a:blipFill>
           <a:ln>
             <a:noFill/>
           </a:ln>
@@ -5844,18 +5668,31 @@
       </p:sp>
       <p:sp>
         <p:nvSpPr>
-          <p:cNvPr id="8" name="직사각형 7"/>
+          <p:cNvPr id="15" name="직사각형 14"/>
           <p:cNvSpPr/>
           <p:nvPr/>
         </p:nvSpPr>
         <p:spPr>
           <a:xfrm>
-            <a:off x="3131840" y="525871"/>
+            <a:off x="6263680" y="525870"/>
             <a:ext cx="2880320" cy="1680187"/>
           </a:xfrm>
           <a:prstGeom prst="rect">
             <a:avLst/>
           </a:prstGeom>
+          <a:blipFill dpi="0" rotWithShape="1">
+            <a:blip r:embed="rId4" cstate="print">
+              <a:extLst>
+                <a:ext uri="{28A0092B-C50C-407E-A947-70E740481C1C}">
+                  <a14:useLocalDpi xmlns:a14="http://schemas.microsoft.com/office/drawing/2010/main" val="0"/>
+                </a:ext>
+              </a:extLst>
+            </a:blip>
+            <a:srcRect/>
+            <a:stretch>
+              <a:fillRect/>
+            </a:stretch>
+          </a:blipFill>
           <a:ln>
             <a:noFill/>
           </a:ln>
@@ -5887,18 +5724,142 @@
       </p:sp>
       <p:sp>
         <p:nvSpPr>
-          <p:cNvPr id="15" name="직사각형 14"/>
+          <p:cNvPr id="22" name="TextBox 21"/>
+          <p:cNvSpPr txBox="1"/>
+          <p:nvPr/>
+        </p:nvSpPr>
+        <p:spPr>
+          <a:xfrm>
+            <a:off x="959100" y="2326071"/>
+            <a:ext cx="962123" cy="307777"/>
+          </a:xfrm>
+          <a:prstGeom prst="rect">
+            <a:avLst/>
+          </a:prstGeom>
+          <a:noFill/>
+        </p:spPr>
+        <p:txBody>
+          <a:bodyPr wrap="none" rtlCol="0">
+            <a:spAutoFit/>
+          </a:bodyPr>
+          <a:lstStyle/>
+          <a:p>
+            <a:pPr algn="ctr"/>
+            <a:r>
+              <a:rPr lang="ko-KR" altLang="en-US" sz="1400" dirty="0" smtClean="0">
+                <a:solidFill>
+                  <a:schemeClr val="tx2">
+                    <a:lumMod val="60000"/>
+                    <a:lumOff val="40000"/>
+                  </a:schemeClr>
+                </a:solidFill>
+                <a:latin typeface="G마켓 산스 Bold" pitchFamily="50" charset="-127"/>
+                <a:ea typeface="G마켓 산스 Bold" pitchFamily="50" charset="-127"/>
+              </a:rPr>
+              <a:t>메인 화면</a:t>
+            </a:r>
+            <a:endParaRPr lang="en-US" altLang="ko-KR" sz="1400" dirty="0">
+              <a:solidFill>
+                <a:schemeClr val="tx2">
+                  <a:lumMod val="60000"/>
+                  <a:lumOff val="40000"/>
+                </a:schemeClr>
+              </a:solidFill>
+              <a:latin typeface="G마켓 산스 Bold" pitchFamily="50" charset="-127"/>
+              <a:ea typeface="G마켓 산스 Bold" pitchFamily="50" charset="-127"/>
+            </a:endParaRPr>
+          </a:p>
+        </p:txBody>
+      </p:sp>
+      <p:sp>
+        <p:nvSpPr>
+          <p:cNvPr id="23" name="TextBox 22"/>
+          <p:cNvSpPr txBox="1"/>
+          <p:nvPr/>
+        </p:nvSpPr>
+        <p:spPr>
+          <a:xfrm>
+            <a:off x="4001171" y="2335981"/>
+            <a:ext cx="1141659" cy="307777"/>
+          </a:xfrm>
+          <a:prstGeom prst="rect">
+            <a:avLst/>
+          </a:prstGeom>
+          <a:noFill/>
+        </p:spPr>
+        <p:txBody>
+          <a:bodyPr wrap="none" rtlCol="0">
+            <a:spAutoFit/>
+          </a:bodyPr>
+          <a:lstStyle/>
+          <a:p>
+            <a:pPr algn="ctr"/>
+            <a:r>
+              <a:rPr lang="ko-KR" altLang="en-US" sz="1400" dirty="0" smtClean="0">
+                <a:solidFill>
+                  <a:schemeClr val="tx2">
+                    <a:lumMod val="60000"/>
+                    <a:lumOff val="40000"/>
+                  </a:schemeClr>
+                </a:solidFill>
+                <a:latin typeface="G마켓 산스 Bold" pitchFamily="50" charset="-127"/>
+                <a:ea typeface="G마켓 산스 Bold" pitchFamily="50" charset="-127"/>
+              </a:rPr>
+              <a:t>메인 </a:t>
+            </a:r>
+            <a:r>
+              <a:rPr lang="ko-KR" altLang="en-US" sz="1400" dirty="0" err="1" smtClean="0">
+                <a:solidFill>
+                  <a:schemeClr val="tx2">
+                    <a:lumMod val="60000"/>
+                    <a:lumOff val="40000"/>
+                  </a:schemeClr>
+                </a:solidFill>
+                <a:latin typeface="G마켓 산스 Bold" pitchFamily="50" charset="-127"/>
+                <a:ea typeface="G마켓 산스 Bold" pitchFamily="50" charset="-127"/>
+              </a:rPr>
+              <a:t>캐러셀</a:t>
+            </a:r>
+            <a:endParaRPr lang="en-US" altLang="ko-KR" sz="1400" dirty="0">
+              <a:solidFill>
+                <a:schemeClr val="tx2">
+                  <a:lumMod val="60000"/>
+                  <a:lumOff val="40000"/>
+                </a:schemeClr>
+              </a:solidFill>
+              <a:latin typeface="G마켓 산스 Bold" pitchFamily="50" charset="-127"/>
+              <a:ea typeface="G마켓 산스 Bold" pitchFamily="50" charset="-127"/>
+            </a:endParaRPr>
+          </a:p>
+        </p:txBody>
+      </p:sp>
+      <p:sp>
+        <p:nvSpPr>
+          <p:cNvPr id="25" name="직사각형 24"/>
           <p:cNvSpPr/>
           <p:nvPr/>
         </p:nvSpPr>
         <p:spPr>
           <a:xfrm>
-            <a:off x="6263680" y="525870"/>
+            <a:off x="0" y="2758119"/>
             <a:ext cx="2880320" cy="1680187"/>
           </a:xfrm>
           <a:prstGeom prst="rect">
             <a:avLst/>
           </a:prstGeom>
+          <a:blipFill dpi="0" rotWithShape="1">
+            <a:blip r:embed="rId5" cstate="print">
+              <a:extLst>
+                <a:ext uri="{28A0092B-C50C-407E-A947-70E740481C1C}">
+                  <a14:useLocalDpi xmlns:a14="http://schemas.microsoft.com/office/drawing/2010/main" val="0"/>
+                </a:ext>
+              </a:extLst>
+            </a:blip>
+            <a:srcRect/>
+            <a:stretch>
+              <a:fillRect/>
+            </a:stretch>
+          </a:blipFill>
           <a:ln>
             <a:noFill/>
           </a:ln>
@@ -5930,14 +5891,14 @@
       </p:sp>
       <p:sp>
         <p:nvSpPr>
-          <p:cNvPr id="22" name="TextBox 21"/>
+          <p:cNvPr id="24" name="TextBox 23"/>
           <p:cNvSpPr txBox="1"/>
           <p:nvPr/>
         </p:nvSpPr>
         <p:spPr>
           <a:xfrm>
-            <a:off x="1001580" y="2326071"/>
-            <a:ext cx="877163" cy="307777"/>
+            <a:off x="6684974" y="2335981"/>
+            <a:ext cx="2037737" cy="307777"/>
           </a:xfrm>
           <a:prstGeom prst="rect">
             <a:avLst/>
@@ -5952,7 +5913,7 @@
           <a:p>
             <a:pPr algn="ctr"/>
             <a:r>
-              <a:rPr lang="ko-KR" altLang="en-US" sz="1400" dirty="0" err="1">
+              <a:rPr lang="ko-KR" altLang="en-US" sz="1400" dirty="0" smtClean="0">
                 <a:solidFill>
                   <a:schemeClr val="tx2">
                     <a:lumMod val="60000"/>
@@ -5962,7 +5923,33 @@
                 <a:latin typeface="G마켓 산스 Bold" pitchFamily="50" charset="-127"/>
                 <a:ea typeface="G마켓 산스 Bold" pitchFamily="50" charset="-127"/>
               </a:rPr>
-              <a:t>메인화면</a:t>
+              <a:t>헤더 메뉴 </a:t>
+            </a:r>
+            <a:r>
+              <a:rPr lang="ko-KR" altLang="en-US" sz="1400" dirty="0" err="1" smtClean="0">
+                <a:solidFill>
+                  <a:schemeClr val="tx2">
+                    <a:lumMod val="60000"/>
+                    <a:lumOff val="40000"/>
+                  </a:schemeClr>
+                </a:solidFill>
+                <a:latin typeface="G마켓 산스 Bold" pitchFamily="50" charset="-127"/>
+                <a:ea typeface="G마켓 산스 Bold" pitchFamily="50" charset="-127"/>
+              </a:rPr>
+              <a:t>호버</a:t>
+            </a:r>
+            <a:r>
+              <a:rPr lang="ko-KR" altLang="en-US" sz="1400" dirty="0" smtClean="0">
+                <a:solidFill>
+                  <a:schemeClr val="tx2">
+                    <a:lumMod val="60000"/>
+                    <a:lumOff val="40000"/>
+                  </a:schemeClr>
+                </a:solidFill>
+                <a:latin typeface="G마켓 산스 Bold" pitchFamily="50" charset="-127"/>
+                <a:ea typeface="G마켓 산스 Bold" pitchFamily="50" charset="-127"/>
+              </a:rPr>
+              <a:t> 및 링크</a:t>
             </a:r>
             <a:endParaRPr lang="en-US" altLang="ko-KR" sz="1400" dirty="0">
               <a:solidFill>
@@ -5979,67 +5966,31 @@
       </p:sp>
       <p:sp>
         <p:nvSpPr>
-          <p:cNvPr id="23" name="TextBox 22"/>
-          <p:cNvSpPr txBox="1"/>
+          <p:cNvPr id="26" name="직사각형 25"/>
+          <p:cNvSpPr/>
           <p:nvPr/>
         </p:nvSpPr>
         <p:spPr>
           <a:xfrm>
-            <a:off x="4108572" y="2335981"/>
-            <a:ext cx="926857" cy="307777"/>
-          </a:xfrm>
-          <a:prstGeom prst="rect">
-            <a:avLst/>
-          </a:prstGeom>
-          <a:noFill/>
-        </p:spPr>
-        <p:txBody>
-          <a:bodyPr wrap="none" rtlCol="0">
-            <a:spAutoFit/>
-          </a:bodyPr>
-          <a:lstStyle/>
-          <a:p>
-            <a:pPr algn="ctr"/>
-            <a:r>
-              <a:rPr lang="ko-KR" altLang="en-US" sz="1400" dirty="0">
-                <a:solidFill>
-                  <a:schemeClr val="tx2">
-                    <a:lumMod val="60000"/>
-                    <a:lumOff val="40000"/>
-                  </a:schemeClr>
-                </a:solidFill>
-                <a:latin typeface="G마켓 산스 Bold" pitchFamily="50" charset="-127"/>
-                <a:ea typeface="G마켓 산스 Bold" pitchFamily="50" charset="-127"/>
-              </a:rPr>
-              <a:t>무슨 기능</a:t>
-            </a:r>
-            <a:endParaRPr lang="en-US" altLang="ko-KR" sz="1400" dirty="0">
-              <a:solidFill>
-                <a:schemeClr val="tx2">
-                  <a:lumMod val="60000"/>
-                  <a:lumOff val="40000"/>
-                </a:schemeClr>
-              </a:solidFill>
-              <a:latin typeface="G마켓 산스 Bold" pitchFamily="50" charset="-127"/>
-              <a:ea typeface="G마켓 산스 Bold" pitchFamily="50" charset="-127"/>
-            </a:endParaRPr>
-          </a:p>
-        </p:txBody>
-      </p:sp>
-      <p:sp>
-        <p:nvSpPr>
-          <p:cNvPr id="25" name="직사각형 24"/>
-          <p:cNvSpPr/>
-          <p:nvPr/>
-        </p:nvSpPr>
-        <p:spPr>
-          <a:xfrm>
-            <a:off x="0" y="2758119"/>
+            <a:off x="3131840" y="2758119"/>
             <a:ext cx="2880320" cy="1680187"/>
           </a:xfrm>
           <a:prstGeom prst="rect">
             <a:avLst/>
           </a:prstGeom>
+          <a:blipFill dpi="0" rotWithShape="1">
+            <a:blip r:embed="rId6" cstate="print">
+              <a:extLst>
+                <a:ext uri="{28A0092B-C50C-407E-A947-70E740481C1C}">
+                  <a14:useLocalDpi xmlns:a14="http://schemas.microsoft.com/office/drawing/2010/main" val="0"/>
+                </a:ext>
+              </a:extLst>
+            </a:blip>
+            <a:srcRect/>
+            <a:stretch>
+              <a:fillRect/>
+            </a:stretch>
+          </a:blipFill>
           <a:ln>
             <a:noFill/>
           </a:ln>
@@ -6071,67 +6022,31 @@
       </p:sp>
       <p:sp>
         <p:nvSpPr>
-          <p:cNvPr id="24" name="TextBox 23"/>
-          <p:cNvSpPr txBox="1"/>
+          <p:cNvPr id="27" name="직사각형 26"/>
+          <p:cNvSpPr/>
           <p:nvPr/>
         </p:nvSpPr>
         <p:spPr>
           <a:xfrm>
-            <a:off x="7240412" y="2335981"/>
-            <a:ext cx="926857" cy="307777"/>
-          </a:xfrm>
-          <a:prstGeom prst="rect">
-            <a:avLst/>
-          </a:prstGeom>
-          <a:noFill/>
-        </p:spPr>
-        <p:txBody>
-          <a:bodyPr wrap="none" rtlCol="0">
-            <a:spAutoFit/>
-          </a:bodyPr>
-          <a:lstStyle/>
-          <a:p>
-            <a:pPr algn="ctr"/>
-            <a:r>
-              <a:rPr lang="ko-KR" altLang="en-US" sz="1400" dirty="0">
-                <a:solidFill>
-                  <a:schemeClr val="tx2">
-                    <a:lumMod val="60000"/>
-                    <a:lumOff val="40000"/>
-                  </a:schemeClr>
-                </a:solidFill>
-                <a:latin typeface="G마켓 산스 Bold" pitchFamily="50" charset="-127"/>
-                <a:ea typeface="G마켓 산스 Bold" pitchFamily="50" charset="-127"/>
-              </a:rPr>
-              <a:t>어떤 화면</a:t>
-            </a:r>
-            <a:endParaRPr lang="en-US" altLang="ko-KR" sz="1400" dirty="0">
-              <a:solidFill>
-                <a:schemeClr val="tx2">
-                  <a:lumMod val="60000"/>
-                  <a:lumOff val="40000"/>
-                </a:schemeClr>
-              </a:solidFill>
-              <a:latin typeface="G마켓 산스 Bold" pitchFamily="50" charset="-127"/>
-              <a:ea typeface="G마켓 산스 Bold" pitchFamily="50" charset="-127"/>
-            </a:endParaRPr>
-          </a:p>
-        </p:txBody>
-      </p:sp>
-      <p:sp>
-        <p:nvSpPr>
-          <p:cNvPr id="26" name="직사각형 25"/>
-          <p:cNvSpPr/>
-          <p:nvPr/>
-        </p:nvSpPr>
-        <p:spPr>
-          <a:xfrm>
-            <a:off x="3131840" y="2758119"/>
+            <a:off x="6263680" y="2758118"/>
             <a:ext cx="2880320" cy="1680187"/>
           </a:xfrm>
           <a:prstGeom prst="rect">
             <a:avLst/>
           </a:prstGeom>
+          <a:blipFill dpi="0" rotWithShape="1">
+            <a:blip r:embed="rId7" cstate="print">
+              <a:extLst>
+                <a:ext uri="{28A0092B-C50C-407E-A947-70E740481C1C}">
+                  <a14:useLocalDpi xmlns:a14="http://schemas.microsoft.com/office/drawing/2010/main" val="0"/>
+                </a:ext>
+              </a:extLst>
+            </a:blip>
+            <a:srcRect/>
+            <a:stretch>
+              <a:fillRect/>
+            </a:stretch>
+          </a:blipFill>
           <a:ln>
             <a:noFill/>
           </a:ln>
@@ -6163,57 +6078,14 @@
       </p:sp>
       <p:sp>
         <p:nvSpPr>
-          <p:cNvPr id="27" name="직사각형 26"/>
-          <p:cNvSpPr/>
-          <p:nvPr/>
-        </p:nvSpPr>
-        <p:spPr>
-          <a:xfrm>
-            <a:off x="6263680" y="2758118"/>
-            <a:ext cx="2880320" cy="1680187"/>
-          </a:xfrm>
-          <a:prstGeom prst="rect">
-            <a:avLst/>
-          </a:prstGeom>
-          <a:ln>
-            <a:noFill/>
-          </a:ln>
-        </p:spPr>
-        <p:style>
-          <a:lnRef idx="2">
-            <a:schemeClr val="accent1">
-              <a:shade val="50000"/>
-            </a:schemeClr>
-          </a:lnRef>
-          <a:fillRef idx="1">
-            <a:schemeClr val="accent1"/>
-          </a:fillRef>
-          <a:effectRef idx="0">
-            <a:schemeClr val="accent1"/>
-          </a:effectRef>
-          <a:fontRef idx="minor">
-            <a:schemeClr val="lt1"/>
-          </a:fontRef>
-        </p:style>
-        <p:txBody>
-          <a:bodyPr rtlCol="0" anchor="ctr"/>
-          <a:lstStyle/>
-          <a:p>
-            <a:pPr algn="ctr"/>
-            <a:endParaRPr lang="ko-KR" altLang="en-US" dirty="0"/>
-          </a:p>
-        </p:txBody>
-      </p:sp>
-      <p:sp>
-        <p:nvSpPr>
           <p:cNvPr id="28" name="TextBox 27"/>
           <p:cNvSpPr txBox="1"/>
           <p:nvPr/>
         </p:nvSpPr>
         <p:spPr>
           <a:xfrm>
-            <a:off x="803611" y="4558319"/>
-            <a:ext cx="1273105" cy="307777"/>
+            <a:off x="241760" y="4558319"/>
+            <a:ext cx="2396811" cy="307777"/>
           </a:xfrm>
           <a:prstGeom prst="rect">
             <a:avLst/>
@@ -6228,7 +6100,7 @@
           <a:p>
             <a:pPr algn="ctr"/>
             <a:r>
-              <a:rPr lang="ko-KR" altLang="en-US" sz="1400" dirty="0">
+              <a:rPr lang="ko-KR" altLang="en-US" sz="1400" dirty="0" smtClean="0">
                 <a:solidFill>
                   <a:schemeClr val="tx2">
                     <a:lumMod val="60000"/>
@@ -6238,7 +6110,7 @@
                 <a:latin typeface="G마켓 산스 Bold" pitchFamily="50" charset="-127"/>
                 <a:ea typeface="G마켓 산스 Bold" pitchFamily="50" charset="-127"/>
               </a:rPr>
-              <a:t>로그인 페이지</a:t>
+              <a:t>검색 바 및 메뉴 애니메이션</a:t>
             </a:r>
             <a:endParaRPr lang="en-US" altLang="ko-KR" sz="1400" dirty="0">
               <a:solidFill>
@@ -6261,8 +6133,8 @@
         </p:nvSpPr>
         <p:spPr>
           <a:xfrm>
-            <a:off x="3935449" y="4568229"/>
-            <a:ext cx="1273105" cy="307777"/>
+            <a:off x="3911404" y="4568229"/>
+            <a:ext cx="1321196" cy="307777"/>
           </a:xfrm>
           <a:prstGeom prst="rect">
             <a:avLst/>
@@ -6277,7 +6149,7 @@
           <a:p>
             <a:pPr algn="ctr"/>
             <a:r>
-              <a:rPr lang="ko-KR" altLang="en-US" sz="1400" dirty="0">
+              <a:rPr lang="ko-KR" altLang="en-US" sz="1400" dirty="0" smtClean="0">
                 <a:solidFill>
                   <a:schemeClr val="tx2">
                     <a:lumMod val="60000"/>
@@ -6287,7 +6159,7 @@
                 <a:latin typeface="G마켓 산스 Bold" pitchFamily="50" charset="-127"/>
                 <a:ea typeface="G마켓 산스 Bold" pitchFamily="50" charset="-127"/>
               </a:rPr>
-              <a:t>커뮤니티 기능</a:t>
+              <a:t>로그인 페이지</a:t>
             </a:r>
             <a:endParaRPr lang="en-US" altLang="ko-KR" sz="1400" dirty="0">
               <a:solidFill>
@@ -6310,8 +6182,8 @@
         </p:nvSpPr>
         <p:spPr>
           <a:xfrm>
-            <a:off x="7067290" y="4568229"/>
-            <a:ext cx="1273104" cy="307777"/>
+            <a:off x="6953478" y="4568229"/>
+            <a:ext cx="1500732" cy="307777"/>
           </a:xfrm>
           <a:prstGeom prst="rect">
             <a:avLst/>
@@ -6326,7 +6198,7 @@
           <a:p>
             <a:pPr algn="ctr"/>
             <a:r>
-              <a:rPr lang="ko-KR" altLang="en-US" sz="1400" dirty="0">
+              <a:rPr lang="ko-KR" altLang="en-US" sz="1400" dirty="0" smtClean="0">
                 <a:solidFill>
                   <a:schemeClr val="tx2">
                     <a:lumMod val="60000"/>
@@ -6336,7 +6208,7 @@
                 <a:latin typeface="G마켓 산스 Bold" pitchFamily="50" charset="-127"/>
                 <a:ea typeface="G마켓 산스 Bold" pitchFamily="50" charset="-127"/>
               </a:rPr>
-              <a:t>어쩌고 저쩌고</a:t>
+              <a:t>회원가입 페이지</a:t>
             </a:r>
             <a:endParaRPr lang="en-US" altLang="ko-KR" sz="1400" dirty="0">
               <a:solidFill>
@@ -6426,7 +6298,7 @@
 </p:sld>
 </file>
 
-<file path=ppt/slides/slide5.xml><?xml version="1.0" encoding="utf-8"?>
+<file path=ppt/slides/slide4.xml><?xml version="1.0" encoding="utf-8"?>
 <p:sld xmlns:a="http://schemas.openxmlformats.org/drawingml/2006/main" xmlns:r="http://schemas.openxmlformats.org/officeDocument/2006/relationships" xmlns:p="http://schemas.openxmlformats.org/presentationml/2006/main">
   <p:cSld>
     <p:spTree>
@@ -6503,7 +6375,7 @@
         <p:spPr>
           <a:xfrm>
             <a:off x="567400" y="843558"/>
-            <a:ext cx="1316386" cy="697587"/>
+            <a:ext cx="1295547" cy="400110"/>
           </a:xfrm>
           <a:prstGeom prst="rect">
             <a:avLst/>
@@ -6520,7 +6392,7 @@
               <a:defRPr lang="ko-KR" altLang="en-US"/>
             </a:pPr>
             <a:r>
-              <a:rPr lang="ko-KR" altLang="en-US" sz="2000">
+              <a:rPr lang="ko-KR" altLang="en-US" sz="2000" dirty="0">
                 <a:solidFill>
                   <a:schemeClr val="tx2">
                     <a:lumMod val="60000"/>
@@ -6530,15 +6402,10 @@
                 <a:latin typeface="G마켓 산스 Bold"/>
                 <a:ea typeface="G마켓 산스 Bold"/>
               </a:rPr>
-              <a:t>핵심 기능 </a:t>
-            </a:r>
-          </a:p>
-          <a:p>
-            <a:pPr lvl="0">
-              <a:defRPr lang="ko-KR" altLang="en-US"/>
-            </a:pPr>
-            <a:r>
-              <a:rPr lang="ko-KR" altLang="en-US" sz="2000">
+              <a:t>핵심 </a:t>
+            </a:r>
+            <a:r>
+              <a:rPr lang="ko-KR" altLang="en-US" sz="2000" dirty="0" smtClean="0">
                 <a:solidFill>
                   <a:schemeClr val="tx2">
                     <a:lumMod val="60000"/>
@@ -6548,9 +6415,9 @@
                 <a:latin typeface="G마켓 산스 Bold"/>
                 <a:ea typeface="G마켓 산스 Bold"/>
               </a:rPr>
-              <a:t>담당 역할</a:t>
-            </a:r>
-            <a:endParaRPr lang="en-US" altLang="ko-KR" sz="2000">
+              <a:t>기능</a:t>
+            </a:r>
+            <a:endParaRPr lang="ko-KR" altLang="en-US" sz="2000" dirty="0">
               <a:solidFill>
                 <a:schemeClr val="tx2">
                   <a:lumMod val="60000"/>
@@ -6572,7 +6439,7 @@
         <p:spPr>
           <a:xfrm>
             <a:off x="567400" y="1676259"/>
-            <a:ext cx="1750800" cy="2284236"/>
+            <a:ext cx="1838965" cy="1892826"/>
           </a:xfrm>
           <a:prstGeom prst="rect">
             <a:avLst/>
@@ -6585,11 +6452,74 @@
           </a:bodyPr>
           <a:lstStyle/>
           <a:p>
+            <a:pPr marL="228600" lvl="0" indent="-228600">
+              <a:buAutoNum type="arabicPeriod"/>
+              <a:defRPr lang="ko-KR" altLang="en-US"/>
+            </a:pPr>
+            <a:r>
+              <a:rPr lang="ko-KR" altLang="en-US" sz="900" dirty="0" smtClean="0">
+                <a:solidFill>
+                  <a:schemeClr val="tx2">
+                    <a:lumMod val="50000"/>
+                  </a:schemeClr>
+                </a:solidFill>
+                <a:latin typeface="G마켓 산스 Medium"/>
+                <a:ea typeface="G마켓 산스 Medium"/>
+              </a:rPr>
+              <a:t>헤더 내비게이션</a:t>
+            </a:r>
+            <a:r>
+              <a:rPr lang="en-US" altLang="ko-KR" sz="900" dirty="0">
+                <a:solidFill>
+                  <a:schemeClr val="tx2">
+                    <a:lumMod val="50000"/>
+                  </a:schemeClr>
+                </a:solidFill>
+                <a:latin typeface="G마켓 산스 Medium"/>
+                <a:ea typeface="G마켓 산스 Medium"/>
+              </a:rPr>
+              <a:t> </a:t>
+            </a:r>
+            <a:r>
+              <a:rPr lang="ko-KR" altLang="en-US" sz="900" dirty="0" err="1" smtClean="0">
+                <a:solidFill>
+                  <a:schemeClr val="tx2">
+                    <a:lumMod val="50000"/>
+                  </a:schemeClr>
+                </a:solidFill>
+                <a:latin typeface="G마켓 산스 Medium"/>
+                <a:ea typeface="G마켓 산스 Medium"/>
+              </a:rPr>
+              <a:t>호버</a:t>
+            </a:r>
+            <a:r>
+              <a:rPr lang="ko-KR" altLang="en-US" sz="900" dirty="0" smtClean="0">
+                <a:solidFill>
+                  <a:schemeClr val="tx2">
+                    <a:lumMod val="50000"/>
+                  </a:schemeClr>
+                </a:solidFill>
+                <a:latin typeface="G마켓 산스 Medium"/>
+                <a:ea typeface="G마켓 산스 Medium"/>
+              </a:rPr>
+              <a:t> 시</a:t>
+            </a:r>
+            <a:endParaRPr lang="en-US" altLang="ko-KR" sz="900" dirty="0" smtClean="0">
+              <a:solidFill>
+                <a:schemeClr val="tx2">
+                  <a:lumMod val="50000"/>
+                </a:schemeClr>
+              </a:solidFill>
+              <a:latin typeface="G마켓 산스 Medium"/>
+              <a:ea typeface="G마켓 산스 Medium"/>
+            </a:endParaRPr>
+          </a:p>
+          <a:p>
             <a:pPr lvl="0">
               <a:defRPr lang="ko-KR" altLang="en-US"/>
             </a:pPr>
             <a:r>
-              <a:rPr lang="ko-KR" altLang="en-US" sz="900" dirty="0">
+              <a:rPr lang="ko-KR" altLang="en-US" sz="900" dirty="0" smtClean="0">
                 <a:solidFill>
                   <a:schemeClr val="tx2">
                     <a:lumMod val="50000"/>
@@ -6598,15 +6528,63 @@
                 <a:latin typeface="G마켓 산스 Medium"/>
                 <a:ea typeface="G마켓 산스 Medium"/>
               </a:rPr>
-              <a:t>프로젝트의 핵심 기능을 구현</a:t>
-            </a:r>
+              <a:t>      애니메이션</a:t>
+            </a:r>
+            <a:r>
+              <a:rPr lang="en-US" altLang="ko-KR" sz="900" dirty="0" smtClean="0">
+                <a:solidFill>
+                  <a:schemeClr val="tx2">
+                    <a:lumMod val="50000"/>
+                  </a:schemeClr>
+                </a:solidFill>
+                <a:latin typeface="G마켓 산스 Medium"/>
+                <a:ea typeface="G마켓 산스 Medium"/>
+              </a:rPr>
+              <a:t> </a:t>
+            </a:r>
+            <a:r>
+              <a:rPr lang="ko-KR" altLang="en-US" sz="900" dirty="0" smtClean="0">
+                <a:solidFill>
+                  <a:schemeClr val="tx2">
+                    <a:lumMod val="50000"/>
+                  </a:schemeClr>
+                </a:solidFill>
+                <a:latin typeface="G마켓 산스 Medium"/>
+                <a:ea typeface="G마켓 산스 Medium"/>
+              </a:rPr>
+              <a:t>구현</a:t>
+            </a:r>
+            <a:endParaRPr lang="en-US" altLang="ko-KR" sz="900" dirty="0" smtClean="0">
+              <a:solidFill>
+                <a:schemeClr val="tx2">
+                  <a:lumMod val="50000"/>
+                </a:schemeClr>
+              </a:solidFill>
+              <a:latin typeface="G마켓 산스 Medium"/>
+              <a:ea typeface="G마켓 산스 Medium"/>
+            </a:endParaRPr>
           </a:p>
           <a:p>
             <a:pPr lvl="0">
               <a:defRPr lang="ko-KR" altLang="en-US"/>
             </a:pPr>
-            <a:r>
-              <a:rPr lang="ko-KR" altLang="en-US" sz="900" dirty="0">
+            <a:endParaRPr lang="en-US" altLang="ko-KR" sz="900" dirty="0" smtClean="0">
+              <a:solidFill>
+                <a:schemeClr val="tx2">
+                  <a:lumMod val="50000"/>
+                </a:schemeClr>
+              </a:solidFill>
+              <a:latin typeface="G마켓 산스 Medium"/>
+              <a:ea typeface="G마켓 산스 Medium"/>
+            </a:endParaRPr>
+          </a:p>
+          <a:p>
+            <a:pPr marL="228600" lvl="0" indent="-228600">
+              <a:buAutoNum type="arabicPeriod" startAt="2"/>
+              <a:defRPr lang="ko-KR" altLang="en-US"/>
+            </a:pPr>
+            <a:r>
+              <a:rPr lang="ko-KR" altLang="en-US" sz="900" dirty="0" err="1" smtClean="0">
                 <a:solidFill>
                   <a:schemeClr val="tx2">
                     <a:lumMod val="50000"/>
@@ -6615,15 +6593,10 @@
                 <a:latin typeface="G마켓 산스 Medium"/>
                 <a:ea typeface="G마켓 산스 Medium"/>
               </a:rPr>
-              <a:t>하는 데에 어떠한 역할을 했는지</a:t>
-            </a:r>
-          </a:p>
-          <a:p>
-            <a:pPr lvl="0">
-              <a:defRPr lang="ko-KR" altLang="en-US"/>
-            </a:pPr>
-            <a:r>
-              <a:rPr lang="ko-KR" altLang="en-US" sz="900" dirty="0">
+              <a:t>캐러셀을</a:t>
+            </a:r>
+            <a:r>
+              <a:rPr lang="ko-KR" altLang="en-US" sz="900" dirty="0" smtClean="0">
                 <a:solidFill>
                   <a:schemeClr val="tx2">
                     <a:lumMod val="50000"/>
@@ -6632,10 +6605,10 @@
                 <a:latin typeface="G마켓 산스 Medium"/>
                 <a:ea typeface="G마켓 산스 Medium"/>
               </a:rPr>
-              <a:t>설명을 적어주세요</a:t>
-            </a:r>
-            <a:r>
-              <a:rPr lang="en-US" altLang="ko-KR" sz="900" dirty="0">
+              <a:t> 통한 시각적 효과</a:t>
+            </a:r>
+            <a:r>
+              <a:rPr lang="en-US" altLang="ko-KR" sz="900" dirty="0" smtClean="0">
                 <a:solidFill>
                   <a:schemeClr val="tx2">
                     <a:lumMod val="50000"/>
@@ -6644,430 +6617,8 @@
                 <a:latin typeface="G마켓 산스 Medium"/>
                 <a:ea typeface="G마켓 산스 Medium"/>
               </a:rPr>
-              <a:t>. </a:t>
-            </a:r>
-            <a:r>
-              <a:rPr lang="ko-KR" altLang="en-US" sz="900" dirty="0">
-                <a:solidFill>
-                  <a:schemeClr val="tx2">
-                    <a:lumMod val="50000"/>
-                  </a:schemeClr>
-                </a:solidFill>
-                <a:latin typeface="G마켓 산스 Medium"/>
-                <a:ea typeface="G마켓 산스 Medium"/>
-              </a:rPr>
-              <a:t>폰트는 </a:t>
-            </a:r>
-          </a:p>
-          <a:p>
-            <a:pPr lvl="0">
-              <a:defRPr lang="ko-KR" altLang="en-US"/>
-            </a:pPr>
-            <a:r>
-              <a:rPr lang="ko-KR" altLang="en-US" sz="900" dirty="0" err="1">
-                <a:solidFill>
-                  <a:schemeClr val="tx2">
-                    <a:lumMod val="50000"/>
-                  </a:schemeClr>
-                </a:solidFill>
-                <a:latin typeface="G마켓 산스 Medium"/>
-                <a:ea typeface="G마켓 산스 Medium"/>
-              </a:rPr>
-              <a:t>지마켓</a:t>
-            </a:r>
-            <a:r>
-              <a:rPr lang="ko-KR" altLang="en-US" sz="900" dirty="0">
-                <a:solidFill>
-                  <a:schemeClr val="tx2">
-                    <a:lumMod val="50000"/>
-                  </a:schemeClr>
-                </a:solidFill>
-                <a:latin typeface="G마켓 산스 Medium"/>
-                <a:ea typeface="G마켓 산스 Medium"/>
-              </a:rPr>
-              <a:t> </a:t>
-            </a:r>
-            <a:r>
-              <a:rPr lang="en-US" altLang="ko-KR" sz="900" dirty="0">
-                <a:solidFill>
-                  <a:schemeClr val="tx2">
-                    <a:lumMod val="50000"/>
-                  </a:schemeClr>
-                </a:solidFill>
-                <a:latin typeface="G마켓 산스 Medium"/>
-                <a:ea typeface="G마켓 산스 Medium"/>
-              </a:rPr>
-              <a:t>Sans </a:t>
-            </a:r>
-            <a:r>
-              <a:rPr lang="ko-KR" altLang="en-US" sz="900" dirty="0" err="1">
-                <a:solidFill>
-                  <a:schemeClr val="tx2">
-                    <a:lumMod val="50000"/>
-                  </a:schemeClr>
-                </a:solidFill>
-                <a:latin typeface="G마켓 산스 Medium"/>
-                <a:ea typeface="G마켓 산스 Medium"/>
-              </a:rPr>
-              <a:t>미디움입니다</a:t>
-            </a:r>
-            <a:r>
-              <a:rPr lang="en-US" altLang="ko-KR" sz="900" dirty="0">
-                <a:solidFill>
-                  <a:schemeClr val="tx2">
-                    <a:lumMod val="50000"/>
-                  </a:schemeClr>
-                </a:solidFill>
-                <a:latin typeface="G마켓 산스 Medium"/>
-                <a:ea typeface="G마켓 산스 Medium"/>
-              </a:rPr>
-              <a:t>.</a:t>
-            </a:r>
-            <a:r>
-              <a:rPr lang="ko-KR" altLang="en-US" sz="900" dirty="0">
-                <a:solidFill>
-                  <a:schemeClr val="tx2">
-                    <a:lumMod val="50000"/>
-                  </a:schemeClr>
-                </a:solidFill>
-                <a:latin typeface="G마켓 산스 Medium"/>
-                <a:ea typeface="G마켓 산스 Medium"/>
-              </a:rPr>
-              <a:t> </a:t>
-            </a:r>
-          </a:p>
-          <a:p>
-            <a:pPr lvl="0">
-              <a:defRPr lang="ko-KR" altLang="en-US"/>
-            </a:pPr>
-            <a:r>
-              <a:rPr lang="en-US" altLang="ko-KR" sz="900" dirty="0">
-                <a:solidFill>
-                  <a:schemeClr val="tx2">
-                    <a:lumMod val="50000"/>
-                  </a:schemeClr>
-                </a:solidFill>
-                <a:latin typeface="G마켓 산스 Medium"/>
-                <a:ea typeface="G마켓 산스 Medium"/>
-              </a:rPr>
-              <a:t>9</a:t>
-            </a:r>
-            <a:r>
-              <a:rPr lang="ko-KR" altLang="en-US" sz="900" dirty="0">
-                <a:solidFill>
-                  <a:schemeClr val="tx2">
-                    <a:lumMod val="50000"/>
-                  </a:schemeClr>
-                </a:solidFill>
-                <a:latin typeface="G마켓 산스 Medium"/>
-                <a:ea typeface="G마켓 산스 Medium"/>
-              </a:rPr>
-              <a:t>포인트 입니다</a:t>
-            </a:r>
-            <a:r>
-              <a:rPr lang="en-US" altLang="ko-KR" sz="900" dirty="0">
-                <a:solidFill>
-                  <a:schemeClr val="tx2">
-                    <a:lumMod val="50000"/>
-                  </a:schemeClr>
-                </a:solidFill>
-                <a:latin typeface="G마켓 산스 Medium"/>
-                <a:ea typeface="G마켓 산스 Medium"/>
-              </a:rPr>
-              <a:t>. </a:t>
-            </a:r>
-            <a:r>
-              <a:rPr lang="ko-KR" altLang="en-US" sz="900" dirty="0">
-                <a:solidFill>
-                  <a:schemeClr val="tx2">
-                    <a:lumMod val="50000"/>
-                  </a:schemeClr>
-                </a:solidFill>
-                <a:latin typeface="G마켓 산스 Medium"/>
-                <a:ea typeface="G마켓 산스 Medium"/>
-              </a:rPr>
-              <a:t>구현 기능에 </a:t>
-            </a:r>
-          </a:p>
-          <a:p>
-            <a:pPr lvl="0">
-              <a:defRPr lang="ko-KR" altLang="en-US"/>
-            </a:pPr>
-            <a:r>
-              <a:rPr lang="ko-KR" altLang="en-US" sz="900" dirty="0">
-                <a:solidFill>
-                  <a:schemeClr val="tx2">
-                    <a:lumMod val="50000"/>
-                  </a:schemeClr>
-                </a:solidFill>
-                <a:latin typeface="G마켓 산스 Medium"/>
-                <a:ea typeface="G마켓 산스 Medium"/>
-              </a:rPr>
-              <a:t>대해 자세히</a:t>
-            </a:r>
-            <a:r>
-              <a:rPr lang="en-US" altLang="ko-KR" sz="900" dirty="0">
-                <a:solidFill>
-                  <a:schemeClr val="tx2">
-                    <a:lumMod val="50000"/>
-                  </a:schemeClr>
-                </a:solidFill>
-                <a:latin typeface="G마켓 산스 Medium"/>
-                <a:ea typeface="G마켓 산스 Medium"/>
-              </a:rPr>
-              <a:t> </a:t>
-            </a:r>
-            <a:r>
-              <a:rPr lang="ko-KR" altLang="en-US" sz="900" dirty="0">
-                <a:solidFill>
-                  <a:schemeClr val="tx2">
-                    <a:lumMod val="50000"/>
-                  </a:schemeClr>
-                </a:solidFill>
-                <a:latin typeface="G마켓 산스 Medium"/>
-                <a:ea typeface="G마켓 산스 Medium"/>
-              </a:rPr>
-              <a:t>설명해도 </a:t>
-            </a:r>
-          </a:p>
-          <a:p>
-            <a:pPr lvl="0">
-              <a:defRPr lang="ko-KR" altLang="en-US"/>
-            </a:pPr>
-            <a:r>
-              <a:rPr lang="ko-KR" altLang="en-US" sz="900" dirty="0">
-                <a:solidFill>
-                  <a:schemeClr val="tx2">
-                    <a:lumMod val="50000"/>
-                  </a:schemeClr>
-                </a:solidFill>
-                <a:latin typeface="G마켓 산스 Medium"/>
-                <a:ea typeface="G마켓 산스 Medium"/>
-              </a:rPr>
-              <a:t>좋습니다</a:t>
-            </a:r>
-            <a:r>
-              <a:rPr lang="en-US" altLang="ko-KR" sz="900" dirty="0">
-                <a:solidFill>
-                  <a:schemeClr val="tx2">
-                    <a:lumMod val="50000"/>
-                  </a:schemeClr>
-                </a:solidFill>
-                <a:latin typeface="G마켓 산스 Medium"/>
-                <a:ea typeface="G마켓 산스 Medium"/>
-              </a:rPr>
-              <a:t>. (</a:t>
-            </a:r>
-            <a:r>
-              <a:rPr lang="ko-KR" altLang="en-US" sz="900" dirty="0">
-                <a:solidFill>
-                  <a:schemeClr val="tx2">
-                    <a:lumMod val="50000"/>
-                  </a:schemeClr>
-                </a:solidFill>
-                <a:latin typeface="G마켓 산스 Medium"/>
-                <a:ea typeface="G마켓 산스 Medium"/>
-              </a:rPr>
-              <a:t>한글 </a:t>
-            </a:r>
-            <a:r>
-              <a:rPr lang="ko-KR" altLang="en-US" sz="900" dirty="0" err="1">
-                <a:solidFill>
-                  <a:schemeClr val="tx2">
-                    <a:lumMod val="50000"/>
-                  </a:schemeClr>
-                </a:solidFill>
-                <a:latin typeface="G마켓 산스 Medium"/>
-                <a:ea typeface="G마켓 산스 Medium"/>
-              </a:rPr>
-              <a:t>입숨</a:t>
-            </a:r>
-            <a:r>
-              <a:rPr lang="en-US" altLang="ko-KR" sz="900" dirty="0">
-                <a:solidFill>
-                  <a:schemeClr val="tx2">
-                    <a:lumMod val="50000"/>
-                  </a:schemeClr>
-                </a:solidFill>
-                <a:latin typeface="G마켓 산스 Medium"/>
-                <a:ea typeface="G마켓 산스 Medium"/>
-              </a:rPr>
-              <a:t>)</a:t>
-            </a:r>
-            <a:r>
-              <a:rPr lang="ko-KR" altLang="en-US" sz="900" dirty="0">
-                <a:solidFill>
-                  <a:schemeClr val="tx2">
-                    <a:lumMod val="50000"/>
-                  </a:schemeClr>
-                </a:solidFill>
-                <a:latin typeface="G마켓 산스 Medium"/>
-                <a:ea typeface="G마켓 산스 Medium"/>
-              </a:rPr>
-              <a:t> 가지에 </a:t>
-            </a:r>
-          </a:p>
-          <a:p>
-            <a:pPr lvl="0">
-              <a:defRPr lang="ko-KR" altLang="en-US"/>
-            </a:pPr>
-            <a:r>
-              <a:rPr lang="ko-KR" altLang="en-US" sz="900" dirty="0">
-                <a:solidFill>
-                  <a:schemeClr val="tx2">
-                    <a:lumMod val="50000"/>
-                  </a:schemeClr>
-                </a:solidFill>
-                <a:latin typeface="G마켓 산스 Medium"/>
-                <a:ea typeface="G마켓 산스 Medium"/>
-              </a:rPr>
-              <a:t>보이는 유소년에게서 </a:t>
-            </a:r>
-          </a:p>
-          <a:p>
-            <a:pPr lvl="0">
-              <a:defRPr lang="ko-KR" altLang="en-US"/>
-            </a:pPr>
-            <a:r>
-              <a:rPr lang="ko-KR" altLang="en-US" sz="900" dirty="0">
-                <a:solidFill>
-                  <a:schemeClr val="tx2">
-                    <a:lumMod val="50000"/>
-                  </a:schemeClr>
-                </a:solidFill>
-                <a:latin typeface="G마켓 산스 Medium"/>
-                <a:ea typeface="G마켓 산스 Medium"/>
-              </a:rPr>
-              <a:t>봄바람을 이상은 풍부하게 </a:t>
-            </a:r>
-          </a:p>
-          <a:p>
-            <a:pPr lvl="0">
-              <a:defRPr lang="ko-KR" altLang="en-US"/>
-            </a:pPr>
-            <a:r>
-              <a:rPr lang="ko-KR" altLang="en-US" sz="900" dirty="0">
-                <a:solidFill>
-                  <a:schemeClr val="tx2">
-                    <a:lumMod val="50000"/>
-                  </a:schemeClr>
-                </a:solidFill>
-                <a:latin typeface="G마켓 산스 Medium"/>
-                <a:ea typeface="G마켓 산스 Medium"/>
-              </a:rPr>
-              <a:t>보배를</a:t>
-            </a:r>
-            <a:r>
-              <a:rPr lang="en-US" altLang="ko-KR" sz="900" dirty="0">
-                <a:solidFill>
-                  <a:schemeClr val="tx2">
-                    <a:lumMod val="50000"/>
-                  </a:schemeClr>
-                </a:solidFill>
-                <a:latin typeface="G마켓 산스 Medium"/>
-                <a:ea typeface="G마켓 산스 Medium"/>
-              </a:rPr>
-              <a:t>. </a:t>
-            </a:r>
-            <a:r>
-              <a:rPr lang="ko-KR" altLang="en-US" sz="900" dirty="0">
-                <a:solidFill>
-                  <a:schemeClr val="tx2">
-                    <a:lumMod val="50000"/>
-                  </a:schemeClr>
-                </a:solidFill>
-                <a:latin typeface="G마켓 산스 Medium"/>
-                <a:ea typeface="G마켓 산스 Medium"/>
-              </a:rPr>
-              <a:t>그들의 되는 피고</a:t>
-            </a:r>
-            <a:r>
-              <a:rPr lang="en-US" altLang="ko-KR" sz="900" dirty="0">
-                <a:solidFill>
-                  <a:schemeClr val="tx2">
-                    <a:lumMod val="50000"/>
-                  </a:schemeClr>
-                </a:solidFill>
-                <a:latin typeface="G마켓 산스 Medium"/>
-                <a:ea typeface="G마켓 산스 Medium"/>
-              </a:rPr>
-              <a:t>, </a:t>
-            </a:r>
-          </a:p>
-          <a:p>
-            <a:pPr lvl="0">
-              <a:defRPr lang="ko-KR" altLang="en-US"/>
-            </a:pPr>
-            <a:r>
-              <a:rPr lang="ko-KR" altLang="en-US" sz="900" dirty="0">
-                <a:solidFill>
-                  <a:schemeClr val="tx2">
-                    <a:lumMod val="50000"/>
-                  </a:schemeClr>
-                </a:solidFill>
-                <a:latin typeface="G마켓 산스 Medium"/>
-                <a:ea typeface="G마켓 산스 Medium"/>
-              </a:rPr>
-              <a:t>천하를 대한 </a:t>
-            </a:r>
-            <a:r>
-              <a:rPr lang="ko-KR" altLang="en-US" sz="900" dirty="0" err="1">
-                <a:solidFill>
-                  <a:schemeClr val="tx2">
-                    <a:lumMod val="50000"/>
-                  </a:schemeClr>
-                </a:solidFill>
-                <a:latin typeface="G마켓 산스 Medium"/>
-                <a:ea typeface="G마켓 산스 Medium"/>
-              </a:rPr>
-              <a:t>두손을</a:t>
-            </a:r>
-            <a:r>
-              <a:rPr lang="ko-KR" altLang="en-US" sz="900" dirty="0">
-                <a:solidFill>
-                  <a:schemeClr val="tx2">
-                    <a:lumMod val="50000"/>
-                  </a:schemeClr>
-                </a:solidFill>
-                <a:latin typeface="G마켓 산스 Medium"/>
-                <a:ea typeface="G마켓 산스 Medium"/>
-              </a:rPr>
-              <a:t> 커다란 </a:t>
-            </a:r>
-          </a:p>
-          <a:p>
-            <a:pPr lvl="0">
-              <a:defRPr lang="ko-KR" altLang="en-US"/>
-            </a:pPr>
-            <a:r>
-              <a:rPr lang="ko-KR" altLang="en-US" sz="900" dirty="0">
-                <a:solidFill>
-                  <a:schemeClr val="tx2">
-                    <a:lumMod val="50000"/>
-                  </a:schemeClr>
-                </a:solidFill>
-                <a:latin typeface="G마켓 산스 Medium"/>
-                <a:ea typeface="G마켓 산스 Medium"/>
-              </a:rPr>
-              <a:t>내는 이상의 봄바람이다</a:t>
-            </a:r>
-            <a:r>
-              <a:rPr lang="en-US" altLang="ko-KR" sz="900" dirty="0">
-                <a:solidFill>
-                  <a:schemeClr val="tx2">
-                    <a:lumMod val="50000"/>
-                  </a:schemeClr>
-                </a:solidFill>
-                <a:latin typeface="G마켓 산스 Medium"/>
-                <a:ea typeface="G마켓 산스 Medium"/>
-              </a:rPr>
-              <a:t>. </a:t>
-            </a:r>
-          </a:p>
-          <a:p>
-            <a:pPr lvl="0">
-              <a:defRPr lang="ko-KR" altLang="en-US"/>
-            </a:pPr>
+              <a:t>:</a:t>
+            </a:r>
             <a:endParaRPr lang="en-US" altLang="ko-KR" sz="900" dirty="0">
               <a:solidFill>
                 <a:schemeClr val="tx2">
@@ -7083,7 +6634,7 @@
               <a:defRPr lang="ko-KR" altLang="en-US"/>
             </a:pPr>
             <a:r>
-              <a:rPr lang="ko-KR" altLang="en-US" sz="900" dirty="0">
+              <a:rPr lang="en-US" altLang="ko-KR" sz="900" dirty="0">
                 <a:solidFill>
                   <a:schemeClr val="tx2">
                     <a:lumMod val="50000"/>
@@ -7092,10 +6643,10 @@
                 <a:latin typeface="G마켓 산스 Medium"/>
                 <a:ea typeface="G마켓 산스 Medium"/>
               </a:rPr>
-              <a:t>동력은 얼마나 </a:t>
-            </a:r>
-            <a:r>
-              <a:rPr lang="ko-KR" altLang="en-US" sz="900" dirty="0" err="1">
+              <a:t> </a:t>
+            </a:r>
+            <a:r>
+              <a:rPr lang="en-US" altLang="ko-KR" sz="900" dirty="0" smtClean="0">
                 <a:solidFill>
                   <a:schemeClr val="tx2">
                     <a:lumMod val="50000"/>
@@ -7104,10 +6655,10 @@
                 <a:latin typeface="G마켓 산스 Medium"/>
                 <a:ea typeface="G마켓 산스 Medium"/>
               </a:rPr>
-              <a:t>얼마나</a:t>
-            </a:r>
-            <a:r>
-              <a:rPr lang="ko-KR" altLang="en-US" sz="900" dirty="0">
+              <a:t>     </a:t>
+            </a:r>
+            <a:r>
+              <a:rPr lang="ko-KR" altLang="en-US" sz="900" dirty="0" smtClean="0">
                 <a:solidFill>
                   <a:schemeClr val="tx2">
                     <a:lumMod val="50000"/>
@@ -7116,15 +6667,39 @@
                 <a:latin typeface="G마켓 산스 Medium"/>
                 <a:ea typeface="G마켓 산스 Medium"/>
               </a:rPr>
-              <a:t> 우리의 </a:t>
-            </a:r>
+              <a:t>자바스크립트 활용</a:t>
+            </a:r>
+            <a:endParaRPr lang="en-US" altLang="ko-KR" sz="900" dirty="0" smtClean="0">
+              <a:solidFill>
+                <a:schemeClr val="tx2">
+                  <a:lumMod val="50000"/>
+                </a:schemeClr>
+              </a:solidFill>
+              <a:latin typeface="G마켓 산스 Medium"/>
+              <a:ea typeface="G마켓 산스 Medium"/>
+            </a:endParaRPr>
           </a:p>
           <a:p>
             <a:pPr lvl="0">
               <a:defRPr lang="ko-KR" altLang="en-US"/>
             </a:pPr>
-            <a:r>
-              <a:rPr lang="ko-KR" altLang="en-US" sz="900" dirty="0">
+            <a:endParaRPr lang="en-US" altLang="ko-KR" sz="900" dirty="0" smtClean="0">
+              <a:solidFill>
+                <a:schemeClr val="tx2">
+                  <a:lumMod val="50000"/>
+                </a:schemeClr>
+              </a:solidFill>
+              <a:latin typeface="G마켓 산스 Medium"/>
+              <a:ea typeface="G마켓 산스 Medium"/>
+            </a:endParaRPr>
+          </a:p>
+          <a:p>
+            <a:pPr marL="228600" lvl="0" indent="-228600">
+              <a:buAutoNum type="arabicPeriod" startAt="3"/>
+              <a:defRPr lang="ko-KR" altLang="en-US"/>
+            </a:pPr>
+            <a:r>
+              <a:rPr lang="ko-KR" altLang="en-US" sz="900" dirty="0" smtClean="0">
                 <a:solidFill>
                   <a:schemeClr val="tx2">
                     <a:lumMod val="50000"/>
@@ -7133,27 +6708,24 @@
                 <a:latin typeface="G마켓 산스 Medium"/>
                 <a:ea typeface="G마켓 산스 Medium"/>
               </a:rPr>
-              <a:t>이것은 보배를 것이다</a:t>
-            </a:r>
-            <a:r>
-              <a:rPr lang="en-US" altLang="ko-KR" sz="900" dirty="0">
-                <a:solidFill>
-                  <a:schemeClr val="tx2">
-                    <a:lumMod val="50000"/>
-                  </a:schemeClr>
-                </a:solidFill>
-                <a:latin typeface="G마켓 산스 Medium"/>
-                <a:ea typeface="G마켓 산스 Medium"/>
-              </a:rPr>
-              <a:t>. </a:t>
-            </a:r>
+              <a:t>상단 검색 창 구현 및</a:t>
+            </a:r>
+            <a:endParaRPr lang="en-US" altLang="ko-KR" sz="900" dirty="0" smtClean="0">
+              <a:solidFill>
+                <a:schemeClr val="tx2">
+                  <a:lumMod val="50000"/>
+                </a:schemeClr>
+              </a:solidFill>
+              <a:latin typeface="G마켓 산스 Medium"/>
+              <a:ea typeface="G마켓 산스 Medium"/>
+            </a:endParaRPr>
           </a:p>
           <a:p>
             <a:pPr lvl="0">
               <a:defRPr lang="ko-KR" altLang="en-US"/>
             </a:pPr>
             <a:r>
-              <a:rPr lang="ko-KR" altLang="en-US" sz="900" dirty="0">
+              <a:rPr lang="en-US" altLang="ko-KR" sz="900" dirty="0">
                 <a:solidFill>
                   <a:schemeClr val="tx2">
                     <a:lumMod val="50000"/>
@@ -7162,7 +6734,233 @@
                 <a:latin typeface="G마켓 산스 Medium"/>
                 <a:ea typeface="G마켓 산스 Medium"/>
               </a:rPr>
-              <a:t>우리 청춘에서만 싸인 피어나기</a:t>
+              <a:t> </a:t>
+            </a:r>
+            <a:r>
+              <a:rPr lang="en-US" altLang="ko-KR" sz="900" dirty="0" smtClean="0">
+                <a:solidFill>
+                  <a:schemeClr val="tx2">
+                    <a:lumMod val="50000"/>
+                  </a:schemeClr>
+                </a:solidFill>
+                <a:latin typeface="G마켓 산스 Medium"/>
+                <a:ea typeface="G마켓 산스 Medium"/>
+              </a:rPr>
+              <a:t>     </a:t>
+            </a:r>
+            <a:r>
+              <a:rPr lang="ko-KR" altLang="en-US" sz="900" dirty="0" smtClean="0">
+                <a:solidFill>
+                  <a:schemeClr val="tx2">
+                    <a:lumMod val="50000"/>
+                  </a:schemeClr>
+                </a:solidFill>
+                <a:latin typeface="G마켓 산스 Medium"/>
+                <a:ea typeface="G마켓 산스 Medium"/>
+              </a:rPr>
+              <a:t>클릭 시 애니메이션 구현</a:t>
+            </a:r>
+            <a:endParaRPr lang="en-US" altLang="ko-KR" sz="900" dirty="0" smtClean="0">
+              <a:solidFill>
+                <a:schemeClr val="tx2">
+                  <a:lumMod val="50000"/>
+                </a:schemeClr>
+              </a:solidFill>
+              <a:latin typeface="G마켓 산스 Medium"/>
+              <a:ea typeface="G마켓 산스 Medium"/>
+            </a:endParaRPr>
+          </a:p>
+          <a:p>
+            <a:pPr lvl="0">
+              <a:defRPr lang="ko-KR" altLang="en-US"/>
+            </a:pPr>
+            <a:endParaRPr lang="en-US" altLang="ko-KR" sz="900" dirty="0" smtClean="0">
+              <a:solidFill>
+                <a:schemeClr val="tx2">
+                  <a:lumMod val="50000"/>
+                </a:schemeClr>
+              </a:solidFill>
+              <a:latin typeface="G마켓 산스 Medium"/>
+              <a:ea typeface="G마켓 산스 Medium"/>
+            </a:endParaRPr>
+          </a:p>
+          <a:p>
+            <a:pPr lvl="0">
+              <a:defRPr lang="ko-KR" altLang="en-US"/>
+            </a:pPr>
+            <a:r>
+              <a:rPr lang="en-US" altLang="ko-KR" sz="900" dirty="0" smtClean="0">
+                <a:solidFill>
+                  <a:schemeClr val="tx2">
+                    <a:lumMod val="50000"/>
+                  </a:schemeClr>
+                </a:solidFill>
+                <a:latin typeface="G마켓 산스 Medium"/>
+                <a:ea typeface="G마켓 산스 Medium"/>
+              </a:rPr>
+              <a:t>4.   </a:t>
+            </a:r>
+            <a:r>
+              <a:rPr lang="ko-KR" altLang="en-US" sz="900" dirty="0" smtClean="0">
+                <a:solidFill>
+                  <a:schemeClr val="tx2">
+                    <a:lumMod val="50000"/>
+                  </a:schemeClr>
+                </a:solidFill>
+                <a:latin typeface="G마켓 산스 Medium"/>
+                <a:ea typeface="G마켓 산스 Medium"/>
+              </a:rPr>
+              <a:t>하단 </a:t>
+            </a:r>
+            <a:r>
+              <a:rPr lang="ko-KR" altLang="en-US" sz="900" dirty="0" err="1" smtClean="0">
+                <a:solidFill>
+                  <a:schemeClr val="tx2">
+                    <a:lumMod val="50000"/>
+                  </a:schemeClr>
+                </a:solidFill>
+                <a:latin typeface="G마켓 산스 Medium"/>
+                <a:ea typeface="G마켓 산스 Medium"/>
+              </a:rPr>
+              <a:t>퀵</a:t>
+            </a:r>
+            <a:r>
+              <a:rPr lang="ko-KR" altLang="en-US" sz="900" dirty="0" smtClean="0">
+                <a:solidFill>
+                  <a:schemeClr val="tx2">
+                    <a:lumMod val="50000"/>
+                  </a:schemeClr>
+                </a:solidFill>
+                <a:latin typeface="G마켓 산스 Medium"/>
+                <a:ea typeface="G마켓 산스 Medium"/>
+              </a:rPr>
+              <a:t> 탑 버튼 구현</a:t>
+            </a:r>
+            <a:endParaRPr lang="en-US" altLang="ko-KR" sz="900" dirty="0" smtClean="0">
+              <a:solidFill>
+                <a:schemeClr val="tx2">
+                  <a:lumMod val="50000"/>
+                </a:schemeClr>
+              </a:solidFill>
+              <a:latin typeface="G마켓 산스 Medium"/>
+              <a:ea typeface="G마켓 산스 Medium"/>
+            </a:endParaRPr>
+          </a:p>
+          <a:p>
+            <a:pPr lvl="0">
+              <a:defRPr lang="ko-KR" altLang="en-US"/>
+            </a:pPr>
+            <a:endParaRPr lang="en-US" altLang="ko-KR" sz="900" dirty="0" smtClean="0">
+              <a:solidFill>
+                <a:schemeClr val="tx2">
+                  <a:lumMod val="50000"/>
+                </a:schemeClr>
+              </a:solidFill>
+              <a:latin typeface="G마켓 산스 Medium"/>
+              <a:ea typeface="G마켓 산스 Medium"/>
+            </a:endParaRPr>
+          </a:p>
+          <a:p>
+            <a:pPr lvl="0">
+              <a:defRPr lang="ko-KR" altLang="en-US"/>
+            </a:pPr>
+            <a:r>
+              <a:rPr lang="en-US" altLang="ko-KR" sz="900" dirty="0" smtClean="0">
+                <a:solidFill>
+                  <a:schemeClr val="tx2">
+                    <a:lumMod val="50000"/>
+                  </a:schemeClr>
+                </a:solidFill>
+                <a:latin typeface="G마켓 산스 Medium"/>
+                <a:ea typeface="G마켓 산스 Medium"/>
+              </a:rPr>
+              <a:t>4.   </a:t>
+            </a:r>
+            <a:r>
+              <a:rPr lang="ko-KR" altLang="en-US" sz="900" dirty="0" smtClean="0">
+                <a:solidFill>
+                  <a:schemeClr val="tx2">
+                    <a:lumMod val="50000"/>
+                  </a:schemeClr>
+                </a:solidFill>
+                <a:latin typeface="G마켓 산스 Medium"/>
+                <a:ea typeface="G마켓 산스 Medium"/>
+              </a:rPr>
+              <a:t>메인 컨텐츠 </a:t>
+            </a:r>
+            <a:r>
+              <a:rPr lang="ko-KR" altLang="en-US" sz="900" dirty="0" err="1" smtClean="0">
+                <a:solidFill>
+                  <a:schemeClr val="tx2">
+                    <a:lumMod val="50000"/>
+                  </a:schemeClr>
+                </a:solidFill>
+                <a:latin typeface="G마켓 산스 Medium"/>
+                <a:ea typeface="G마켓 산스 Medium"/>
+              </a:rPr>
+              <a:t>호버</a:t>
+            </a:r>
+            <a:r>
+              <a:rPr lang="ko-KR" altLang="en-US" sz="900" dirty="0" smtClean="0">
+                <a:solidFill>
+                  <a:schemeClr val="tx2">
+                    <a:lumMod val="50000"/>
+                  </a:schemeClr>
+                </a:solidFill>
+                <a:latin typeface="G마켓 산스 Medium"/>
+                <a:ea typeface="G마켓 산스 Medium"/>
+              </a:rPr>
+              <a:t> 시</a:t>
+            </a:r>
+            <a:endParaRPr lang="en-US" altLang="ko-KR" sz="900" dirty="0" smtClean="0">
+              <a:solidFill>
+                <a:schemeClr val="tx2">
+                  <a:lumMod val="50000"/>
+                </a:schemeClr>
+              </a:solidFill>
+              <a:latin typeface="G마켓 산스 Medium"/>
+              <a:ea typeface="G마켓 산스 Medium"/>
+            </a:endParaRPr>
+          </a:p>
+          <a:p>
+            <a:pPr lvl="0">
+              <a:defRPr lang="ko-KR" altLang="en-US"/>
+            </a:pPr>
+            <a:r>
+              <a:rPr lang="en-US" altLang="ko-KR" sz="900" dirty="0">
+                <a:solidFill>
+                  <a:schemeClr val="tx2">
+                    <a:lumMod val="50000"/>
+                  </a:schemeClr>
+                </a:solidFill>
+                <a:latin typeface="G마켓 산스 Medium"/>
+                <a:ea typeface="G마켓 산스 Medium"/>
+              </a:rPr>
+              <a:t> </a:t>
+            </a:r>
+            <a:r>
+              <a:rPr lang="en-US" altLang="ko-KR" sz="900" dirty="0" smtClean="0">
+                <a:solidFill>
+                  <a:schemeClr val="tx2">
+                    <a:lumMod val="50000"/>
+                  </a:schemeClr>
+                </a:solidFill>
+                <a:latin typeface="G마켓 산스 Medium"/>
+                <a:ea typeface="G마켓 산스 Medium"/>
+              </a:rPr>
+              <a:t>     </a:t>
+            </a:r>
+            <a:r>
+              <a:rPr lang="ko-KR" altLang="en-US" sz="900" dirty="0" smtClean="0">
+                <a:solidFill>
+                  <a:schemeClr val="tx2">
+                    <a:lumMod val="50000"/>
+                  </a:schemeClr>
+                </a:solidFill>
+                <a:latin typeface="G마켓 산스 Medium"/>
+                <a:ea typeface="G마켓 산스 Medium"/>
+              </a:rPr>
+              <a:t>애니메이션 구현</a:t>
             </a:r>
             <a:endParaRPr lang="en-US" altLang="ko-KR" sz="900" dirty="0">
               <a:solidFill>
@@ -7246,7 +7044,7 @@
         <p:spPr>
           <a:xfrm>
             <a:off x="3563888" y="908641"/>
-            <a:ext cx="2899777" cy="338554"/>
+            <a:ext cx="2648482" cy="338554"/>
           </a:xfrm>
           <a:prstGeom prst="rect">
             <a:avLst/>
@@ -7263,7 +7061,7 @@
               <a:defRPr lang="ko-KR" altLang="en-US"/>
             </a:pPr>
             <a:r>
-              <a:rPr lang="ko-KR" altLang="en-US" sz="1600">
+              <a:rPr lang="ko-KR" altLang="en-US" sz="1600" dirty="0" smtClean="0">
                 <a:solidFill>
                   <a:schemeClr val="tx2">
                     <a:lumMod val="60000"/>
@@ -7273,9 +7071,9 @@
                 <a:latin typeface="G마켓 산스 Bold"/>
                 <a:ea typeface="G마켓 산스 Bold"/>
               </a:rPr>
-              <a:t>어떠한 페이지에 이미지 전처리</a:t>
-            </a:r>
-            <a:endParaRPr lang="en-US" altLang="ko-KR" sz="1600">
+              <a:t>메인 페이지 이미지 전처리</a:t>
+            </a:r>
+            <a:endParaRPr lang="en-US" altLang="ko-KR" sz="1600" dirty="0">
               <a:solidFill>
                 <a:schemeClr val="tx2">
                   <a:lumMod val="60000"/>
@@ -7297,7 +7095,7 @@
         <p:spPr>
           <a:xfrm>
             <a:off x="3767470" y="1301738"/>
-            <a:ext cx="2743820" cy="1144282"/>
+            <a:ext cx="3690434" cy="1361911"/>
           </a:xfrm>
           <a:prstGeom prst="rect">
             <a:avLst/>
@@ -7319,7 +7117,7 @@
               <a:defRPr lang="ko-KR" altLang="en-US"/>
             </a:pPr>
             <a:r>
-              <a:rPr lang="ko-KR" altLang="en-US" sz="1000">
+              <a:rPr lang="en-US" altLang="ko-KR" sz="1000" dirty="0" smtClean="0">
                 <a:solidFill>
                   <a:schemeClr val="tx2">
                     <a:lumMod val="50000"/>
@@ -7328,8 +7126,53 @@
                 <a:latin typeface="G마켓 산스 Bold"/>
                 <a:ea typeface="G마켓 산스 Bold"/>
               </a:rPr>
-              <a:t>배경 제거</a:t>
-            </a:r>
+              <a:t>Z-index</a:t>
+            </a:r>
+            <a:r>
+              <a:rPr lang="ko-KR" altLang="en-US" sz="1000" dirty="0" smtClean="0">
+                <a:solidFill>
+                  <a:schemeClr val="tx2">
+                    <a:lumMod val="50000"/>
+                  </a:schemeClr>
+                </a:solidFill>
+                <a:latin typeface="G마켓 산스 Bold"/>
+                <a:ea typeface="G마켓 산스 Bold"/>
+              </a:rPr>
+              <a:t>를 활용한 </a:t>
+            </a:r>
+            <a:r>
+              <a:rPr lang="ko-KR" altLang="en-US" sz="1000" dirty="0" err="1" smtClean="0">
+                <a:solidFill>
+                  <a:schemeClr val="tx2">
+                    <a:lumMod val="50000"/>
+                  </a:schemeClr>
+                </a:solidFill>
+                <a:latin typeface="G마켓 산스 Bold"/>
+                <a:ea typeface="G마켓 산스 Bold"/>
+              </a:rPr>
+              <a:t>캐러셀</a:t>
+            </a:r>
+            <a:r>
+              <a:rPr lang="ko-KR" altLang="en-US" sz="1000" dirty="0" smtClean="0">
+                <a:solidFill>
+                  <a:schemeClr val="tx2">
+                    <a:lumMod val="50000"/>
+                  </a:schemeClr>
+                </a:solidFill>
+                <a:latin typeface="G마켓 산스 Bold"/>
+                <a:ea typeface="G마켓 산스 Bold"/>
+              </a:rPr>
+              <a:t> 구현</a:t>
+            </a:r>
+            <a:endParaRPr lang="ko-KR" altLang="en-US" sz="1000" dirty="0">
+              <a:solidFill>
+                <a:schemeClr val="tx2">
+                  <a:lumMod val="50000"/>
+                </a:schemeClr>
+              </a:solidFill>
+              <a:latin typeface="G마켓 산스 Bold"/>
+              <a:ea typeface="G마켓 산스 Bold"/>
+            </a:endParaRPr>
           </a:p>
           <a:p>
             <a:pPr marL="685748" lvl="1" indent="-228600">
@@ -7341,7 +7184,7 @@
               <a:defRPr lang="ko-KR" altLang="en-US"/>
             </a:pPr>
             <a:r>
-              <a:rPr lang="ko-KR" altLang="en-US" sz="900">
+              <a:rPr lang="en-US" altLang="ko-KR" sz="900" dirty="0" err="1" smtClean="0">
                 <a:solidFill>
                   <a:schemeClr val="tx2">
                     <a:lumMod val="50000"/>
@@ -7350,8 +7193,77 @@
                 <a:latin typeface="G마켓 산스 Medium"/>
                 <a:ea typeface="G마켓 산스 Medium"/>
               </a:rPr>
-              <a:t>무슨 어쩌고에 그렇게 진행</a:t>
-            </a:r>
+              <a:t>Javascript</a:t>
+            </a:r>
+            <a:r>
+              <a:rPr lang="ko-KR" altLang="en-US" sz="900" dirty="0" smtClean="0">
+                <a:solidFill>
+                  <a:schemeClr val="tx2">
+                    <a:lumMod val="50000"/>
+                  </a:schemeClr>
+                </a:solidFill>
+                <a:latin typeface="G마켓 산스 Medium"/>
+                <a:ea typeface="G마켓 산스 Medium"/>
+              </a:rPr>
+              <a:t>를 활용하여 간단한 </a:t>
+            </a:r>
+            <a:r>
+              <a:rPr lang="ko-KR" altLang="en-US" sz="900" dirty="0" err="1" smtClean="0">
+                <a:solidFill>
+                  <a:schemeClr val="tx2">
+                    <a:lumMod val="50000"/>
+                  </a:schemeClr>
+                </a:solidFill>
+                <a:latin typeface="G마켓 산스 Medium"/>
+                <a:ea typeface="G마켓 산스 Medium"/>
+              </a:rPr>
+              <a:t>캐러셀</a:t>
+            </a:r>
+            <a:r>
+              <a:rPr lang="ko-KR" altLang="en-US" sz="900" dirty="0" smtClean="0">
+                <a:solidFill>
+                  <a:schemeClr val="tx2">
+                    <a:lumMod val="50000"/>
+                  </a:schemeClr>
+                </a:solidFill>
+                <a:latin typeface="G마켓 산스 Medium"/>
+                <a:ea typeface="G마켓 산스 Medium"/>
+              </a:rPr>
+              <a:t> </a:t>
+            </a:r>
+            <a:r>
+              <a:rPr lang="en-US" altLang="ko-KR" sz="900" dirty="0" smtClean="0">
+                <a:solidFill>
+                  <a:schemeClr val="tx2">
+                    <a:lumMod val="50000"/>
+                  </a:schemeClr>
+                </a:solidFill>
+                <a:latin typeface="G마켓 산스 Medium"/>
+                <a:ea typeface="G마켓 산스 Medium"/>
+              </a:rPr>
+              <a:t>2</a:t>
+            </a:r>
+            <a:r>
+              <a:rPr lang="ko-KR" altLang="en-US" sz="900" dirty="0" smtClean="0">
+                <a:solidFill>
+                  <a:schemeClr val="tx2">
+                    <a:lumMod val="50000"/>
+                  </a:schemeClr>
+                </a:solidFill>
+                <a:latin typeface="G마켓 산스 Medium"/>
+                <a:ea typeface="G마켓 산스 Medium"/>
+              </a:rPr>
+              <a:t>종 구현</a:t>
+            </a:r>
+            <a:endParaRPr lang="ko-KR" altLang="en-US" sz="900" dirty="0">
+              <a:solidFill>
+                <a:schemeClr val="tx2">
+                  <a:lumMod val="50000"/>
+                </a:schemeClr>
+              </a:solidFill>
+              <a:latin typeface="G마켓 산스 Medium"/>
+              <a:ea typeface="G마켓 산스 Medium"/>
+            </a:endParaRPr>
           </a:p>
           <a:p>
             <a:pPr marL="685748" lvl="1" indent="-228600">
@@ -7363,7 +7275,7 @@
               <a:defRPr lang="ko-KR" altLang="en-US"/>
             </a:pPr>
             <a:r>
-              <a:rPr lang="ko-KR" altLang="en-US" sz="900">
+              <a:rPr lang="ko-KR" altLang="en-US" sz="900" dirty="0" err="1" smtClean="0">
                 <a:solidFill>
                   <a:schemeClr val="tx2">
                     <a:lumMod val="50000"/>
@@ -7372,7 +7284,19 @@
                 <a:latin typeface="G마켓 산스 Medium"/>
                 <a:ea typeface="G마켓 산스 Medium"/>
               </a:rPr>
-              <a:t>어떠한 문제점이 있었으나 그렇게 해결</a:t>
+              <a:t>캐러셀</a:t>
+            </a:r>
+            <a:r>
+              <a:rPr lang="ko-KR" altLang="en-US" sz="900" dirty="0" smtClean="0">
+                <a:solidFill>
+                  <a:schemeClr val="tx2">
+                    <a:lumMod val="50000"/>
+                  </a:schemeClr>
+                </a:solidFill>
+                <a:latin typeface="G마켓 산스 Medium"/>
+                <a:ea typeface="G마켓 산스 Medium"/>
+              </a:rPr>
+              <a:t> 내부 이동 버튼 애니메이션 구현</a:t>
             </a:r>
           </a:p>
           <a:p>
@@ -7385,7 +7309,7 @@
               <a:defRPr lang="ko-KR" altLang="en-US"/>
             </a:pPr>
             <a:r>
-              <a:rPr lang="ko-KR" altLang="en-US" sz="900">
+              <a:rPr lang="en-US" altLang="ko-KR" sz="900" dirty="0" smtClean="0">
                 <a:solidFill>
                   <a:schemeClr val="tx2">
                     <a:lumMod val="50000"/>
@@ -7394,10 +7318,10 @@
                 <a:latin typeface="G마켓 산스 Bold"/>
                 <a:ea typeface="G마켓 산스 Bold"/>
               </a:rPr>
-              <a:t>크기 조정</a:t>
-            </a:r>
-            <a:r>
-              <a:rPr lang="en-US" altLang="ko-KR" sz="900">
+              <a:t>A</a:t>
+            </a:r>
+            <a:r>
+              <a:rPr lang="ko-KR" altLang="en-US" sz="900" dirty="0" smtClean="0">
                 <a:solidFill>
                   <a:schemeClr val="tx2">
                     <a:lumMod val="50000"/>
@@ -7406,44 +7330,18 @@
                 <a:latin typeface="G마켓 산스 Bold"/>
                 <a:ea typeface="G마켓 산스 Bold"/>
               </a:rPr>
-              <a:t>(</a:t>
-            </a:r>
-            <a:r>
-              <a:rPr lang="ko-KR" altLang="en-US" sz="900">
-                <a:solidFill>
-                  <a:schemeClr val="tx2">
-                    <a:lumMod val="50000"/>
-                  </a:schemeClr>
-                </a:solidFill>
-                <a:latin typeface="G마켓 산스 Bold"/>
-                <a:ea typeface="G마켓 산스 Bold"/>
-              </a:rPr>
-              <a:t>지마켓 </a:t>
-            </a:r>
-            <a:r>
-              <a:rPr lang="en-US" altLang="ko-KR" sz="900">
-                <a:solidFill>
-                  <a:schemeClr val="tx2">
-                    <a:lumMod val="50000"/>
-                  </a:schemeClr>
-                </a:solidFill>
-                <a:latin typeface="G마켓 산스 Bold"/>
-                <a:ea typeface="G마켓 산스 Bold"/>
-              </a:rPr>
-              <a:t>Sans Bold)</a:t>
-            </a:r>
-          </a:p>
-          <a:p>
-            <a:pPr marL="685748" lvl="1" indent="-228600">
+              <a:t>태그를 활용한 주요 링크 구현</a:t>
+            </a:r>
+          </a:p>
+          <a:p>
+            <a:pPr lvl="1">
               <a:lnSpc>
                 <a:spcPct val="150000"/>
               </a:lnSpc>
-              <a:buFont typeface="+mj-lt"/>
-              <a:buAutoNum type="arabicPeriod"/>
               <a:defRPr lang="ko-KR" altLang="en-US"/>
             </a:pPr>
             <a:r>
-              <a:rPr lang="ko-KR" altLang="en-US" sz="900">
+              <a:rPr lang="ko-KR" altLang="en-US" sz="900" dirty="0" smtClean="0">
                 <a:solidFill>
                   <a:schemeClr val="tx2">
                     <a:lumMod val="50000"/>
@@ -7452,9 +7350,77 @@
                 <a:latin typeface="G마켓 산스 Medium"/>
                 <a:ea typeface="G마켓 산스 Medium"/>
               </a:rPr>
-              <a:t>어떠어떠한 문제에서 그렇게 진행</a:t>
-            </a:r>
-            <a:endParaRPr lang="en-US" altLang="ko-KR" sz="900">
+              <a:t>실제 한국주택금융공사 메인 페이지의 기능과 유사하도록</a:t>
+            </a:r>
+            <a:r>
+              <a:rPr lang="en-US" altLang="ko-KR" sz="900" dirty="0" smtClean="0">
+                <a:solidFill>
+                  <a:schemeClr val="tx2">
+                    <a:lumMod val="50000"/>
+                  </a:schemeClr>
+                </a:solidFill>
+                <a:latin typeface="G마켓 산스 Medium"/>
+                <a:ea typeface="G마켓 산스 Medium"/>
+              </a:rPr>
+              <a:t>,</a:t>
+            </a:r>
+          </a:p>
+          <a:p>
+            <a:pPr lvl="1">
+              <a:lnSpc>
+                <a:spcPct val="150000"/>
+              </a:lnSpc>
+              <a:defRPr lang="ko-KR" altLang="en-US"/>
+            </a:pPr>
+            <a:r>
+              <a:rPr lang="en-US" altLang="ko-KR" sz="900" dirty="0" smtClean="0">
+                <a:solidFill>
+                  <a:schemeClr val="tx2">
+                    <a:lumMod val="50000"/>
+                  </a:schemeClr>
+                </a:solidFill>
+                <a:latin typeface="G마켓 산스 Medium"/>
+                <a:ea typeface="G마켓 산스 Medium"/>
+              </a:rPr>
+              <a:t>A</a:t>
+            </a:r>
+            <a:r>
+              <a:rPr lang="ko-KR" altLang="en-US" sz="900" dirty="0" smtClean="0">
+                <a:solidFill>
+                  <a:schemeClr val="tx2">
+                    <a:lumMod val="50000"/>
+                  </a:schemeClr>
+                </a:solidFill>
+                <a:latin typeface="G마켓 산스 Medium"/>
+                <a:ea typeface="G마켓 산스 Medium"/>
+              </a:rPr>
+              <a:t>태그를 통해 실제 </a:t>
+            </a:r>
+            <a:r>
+              <a:rPr lang="en-US" altLang="ko-KR" sz="900" dirty="0" smtClean="0">
+                <a:solidFill>
+                  <a:schemeClr val="tx2">
+                    <a:lumMod val="50000"/>
+                  </a:schemeClr>
+                </a:solidFill>
+                <a:latin typeface="G마켓 산스 Medium"/>
+                <a:ea typeface="G마켓 산스 Medium"/>
+              </a:rPr>
+              <a:t>HTTPS</a:t>
+            </a:r>
+            <a:r>
+              <a:rPr lang="ko-KR" altLang="en-US" sz="900" dirty="0" smtClean="0">
+                <a:solidFill>
+                  <a:schemeClr val="tx2">
+                    <a:lumMod val="50000"/>
+                  </a:schemeClr>
+                </a:solidFill>
+                <a:latin typeface="G마켓 산스 Medium"/>
+                <a:ea typeface="G마켓 산스 Medium"/>
+              </a:rPr>
+              <a:t>와 연결</a:t>
+            </a:r>
+            <a:endParaRPr lang="en-US" altLang="ko-KR" sz="900" dirty="0">
               <a:solidFill>
                 <a:schemeClr val="tx2">
                   <a:lumMod val="50000"/>
@@ -7536,7 +7502,7 @@
         <p:spPr>
           <a:xfrm>
             <a:off x="3563888" y="2824645"/>
-            <a:ext cx="3595102" cy="338554"/>
+            <a:ext cx="3127779" cy="338554"/>
           </a:xfrm>
           <a:prstGeom prst="rect">
             <a:avLst/>
@@ -7553,7 +7519,7 @@
               <a:defRPr lang="ko-KR" altLang="en-US"/>
             </a:pPr>
             <a:r>
-              <a:rPr lang="ko-KR" altLang="en-US" sz="1600">
+              <a:rPr lang="ko-KR" altLang="en-US" sz="1600" dirty="0" smtClean="0">
                 <a:solidFill>
                   <a:schemeClr val="tx2">
                     <a:lumMod val="60000"/>
@@ -7563,9 +7529,9 @@
                 <a:latin typeface="G마켓 산스 Bold"/>
                 <a:ea typeface="G마켓 산스 Bold"/>
               </a:rPr>
-              <a:t>주요 서비스의 그러한 추천 시스템 구현</a:t>
-            </a:r>
-            <a:endParaRPr lang="en-US" altLang="ko-KR" sz="1600">
+              <a:t>로그인 및 회원가입 페이지 구현</a:t>
+            </a:r>
+            <a:endParaRPr lang="en-US" altLang="ko-KR" sz="1600" dirty="0">
               <a:solidFill>
                 <a:schemeClr val="tx2">
                   <a:lumMod val="60000"/>
@@ -7587,7 +7553,7 @@
         <p:spPr>
           <a:xfrm>
             <a:off x="3767470" y="3217742"/>
-            <a:ext cx="2743820" cy="1142803"/>
+            <a:ext cx="3619902" cy="507831"/>
           </a:xfrm>
           <a:prstGeom prst="rect">
             <a:avLst/>
@@ -7600,50 +7566,46 @@
           </a:bodyPr>
           <a:lstStyle/>
           <a:p>
-            <a:pPr marL="228600" indent="-228600">
+            <a:pPr>
               <a:lnSpc>
                 <a:spcPct val="150000"/>
               </a:lnSpc>
-              <a:buFont typeface="+mj-lt"/>
-              <a:buAutoNum type="arabicPeriod"/>
               <a:defRPr lang="ko-KR" altLang="en-US"/>
             </a:pPr>
             <a:r>
-              <a:rPr lang="en-US" altLang="ko-KR" sz="1000">
-                <a:solidFill>
-                  <a:schemeClr val="tx2">
-                    <a:lumMod val="50000"/>
-                  </a:schemeClr>
-                </a:solidFill>
-                <a:latin typeface="G마켓 산스 Bold"/>
-                <a:ea typeface="G마켓 산스 Bold"/>
-              </a:rPr>
-              <a:t>TensorFlow</a:t>
-            </a:r>
-            <a:r>
-              <a:rPr lang="ko-KR" altLang="en-US" sz="1000">
-                <a:solidFill>
-                  <a:schemeClr val="tx2">
-                    <a:lumMod val="50000"/>
-                  </a:schemeClr>
-                </a:solidFill>
-                <a:latin typeface="G마켓 산스 Bold"/>
-                <a:ea typeface="G마켓 산스 Bold"/>
-              </a:rPr>
-              <a:t>를 활용한 추천시스템 구현</a:t>
-            </a:r>
-          </a:p>
-          <a:p>
-            <a:pPr marL="685748" lvl="1" indent="-228600">
+              <a:rPr lang="ko-KR" altLang="en-US" sz="900" dirty="0" smtClean="0">
+                <a:solidFill>
+                  <a:schemeClr val="tx2">
+                    <a:lumMod val="50000"/>
+                  </a:schemeClr>
+                </a:solidFill>
+                <a:latin typeface="G마켓 산스 Medium"/>
+                <a:ea typeface="G마켓 산스 Medium"/>
+              </a:rPr>
+              <a:t>     실제 레이아웃과 거의 유사하도록 구현</a:t>
+            </a:r>
+            <a:r>
+              <a:rPr lang="en-US" altLang="ko-KR" sz="900" dirty="0" smtClean="0">
+                <a:solidFill>
+                  <a:schemeClr val="tx2">
+                    <a:lumMod val="50000"/>
+                  </a:schemeClr>
+                </a:solidFill>
+                <a:latin typeface="G마켓 산스 Medium"/>
+                <a:ea typeface="G마켓 산스 Medium"/>
+              </a:rPr>
+              <a:t>.</a:t>
+            </a:r>
+          </a:p>
+          <a:p>
+            <a:pPr>
               <a:lnSpc>
                 <a:spcPct val="150000"/>
               </a:lnSpc>
-              <a:buFont typeface="+mj-lt"/>
-              <a:buAutoNum type="arabicPeriod"/>
               <a:defRPr lang="ko-KR" altLang="en-US"/>
             </a:pPr>
             <a:r>
-              <a:rPr lang="ko-KR" altLang="en-US" sz="900">
+              <a:rPr lang="en-US" altLang="ko-KR" sz="900" dirty="0">
                 <a:solidFill>
                   <a:schemeClr val="tx2">
                     <a:lumMod val="50000"/>
@@ -7652,20 +7614,10 @@
                 <a:latin typeface="G마켓 산스 Medium"/>
                 <a:ea typeface="G마켓 산스 Medium"/>
               </a:rPr>
-              <a:t>무슨 어쩌고에 그렇게 진행</a:t>
-            </a:r>
-          </a:p>
-          <a:p>
-            <a:pPr marL="685748" lvl="1" indent="-228600">
-              <a:lnSpc>
-                <a:spcPct val="150000"/>
-              </a:lnSpc>
-              <a:buFont typeface="+mj-lt"/>
-              <a:buAutoNum type="arabicPeriod"/>
-              <a:defRPr lang="ko-KR" altLang="en-US"/>
-            </a:pPr>
-            <a:r>
-              <a:rPr lang="ko-KR" altLang="en-US" sz="900">
+              <a:t> </a:t>
+            </a:r>
+            <a:r>
+              <a:rPr lang="en-US" altLang="ko-KR" sz="900" dirty="0" smtClean="0">
                 <a:solidFill>
                   <a:schemeClr val="tx2">
                     <a:lumMod val="50000"/>
@@ -7674,54 +7626,10 @@
                 <a:latin typeface="G마켓 산스 Medium"/>
                 <a:ea typeface="G마켓 산스 Medium"/>
               </a:rPr>
-              <a:t>어떠한 문제점이 있었으나 그렇게 해결</a:t>
-            </a:r>
-          </a:p>
-          <a:p>
-            <a:pPr marL="228600" indent="-228600">
-              <a:lnSpc>
-                <a:spcPct val="150000"/>
-              </a:lnSpc>
-              <a:buFont typeface="+mj-lt"/>
-              <a:buAutoNum type="arabicPeriod"/>
-              <a:defRPr lang="ko-KR" altLang="en-US"/>
-            </a:pPr>
-            <a:r>
-              <a:rPr lang="en-US" altLang="ko-KR" sz="900">
-                <a:solidFill>
-                  <a:schemeClr val="tx2">
-                    <a:lumMod val="50000"/>
-                  </a:schemeClr>
-                </a:solidFill>
-                <a:latin typeface="G마켓 산스 Bold"/>
-                <a:ea typeface="G마켓 산스 Bold"/>
-              </a:rPr>
-              <a:t>TensorFlow</a:t>
-            </a:r>
-            <a:r>
-              <a:rPr lang="ko-KR" altLang="en-US" sz="900">
-                <a:solidFill>
-                  <a:schemeClr val="tx2">
-                    <a:lumMod val="50000"/>
-                  </a:schemeClr>
-                </a:solidFill>
-                <a:latin typeface="G마켓 산스 Bold"/>
-                <a:ea typeface="G마켓 산스 Bold"/>
-              </a:rPr>
-              <a:t>를 활용한 추천시스템 구현</a:t>
-            </a:r>
-          </a:p>
-          <a:p>
-            <a:pPr marL="685748" lvl="1" indent="-228600">
-              <a:lnSpc>
-                <a:spcPct val="150000"/>
-              </a:lnSpc>
-              <a:buFont typeface="+mj-lt"/>
-              <a:buAutoNum type="arabicPeriod"/>
-              <a:defRPr lang="ko-KR" altLang="en-US"/>
-            </a:pPr>
-            <a:r>
-              <a:rPr lang="ko-KR" altLang="en-US" sz="900">
+              <a:t>    </a:t>
+            </a:r>
+            <a:r>
+              <a:rPr lang="ko-KR" altLang="en-US" sz="900" dirty="0" smtClean="0">
                 <a:solidFill>
                   <a:schemeClr val="tx2">
                     <a:lumMod val="50000"/>
@@ -7730,9 +7638,69 @@
                 <a:latin typeface="G마켓 산스 Medium"/>
                 <a:ea typeface="G마켓 산스 Medium"/>
               </a:rPr>
-              <a:t>어떠어떠한 문제에서 그렇게 진행</a:t>
-            </a:r>
-            <a:endParaRPr lang="en-US" altLang="ko-KR" sz="900">
+              <a:t>훈련 목적을 위해</a:t>
+            </a:r>
+            <a:r>
+              <a:rPr lang="en-US" altLang="ko-KR" sz="900" dirty="0" smtClean="0">
+                <a:solidFill>
+                  <a:schemeClr val="tx2">
+                    <a:lumMod val="50000"/>
+                  </a:schemeClr>
+                </a:solidFill>
+                <a:latin typeface="G마켓 산스 Medium"/>
+                <a:ea typeface="G마켓 산스 Medium"/>
+              </a:rPr>
+              <a:t>, </a:t>
+            </a:r>
+            <a:r>
+              <a:rPr lang="ko-KR" altLang="en-US" sz="900" dirty="0" smtClean="0">
+                <a:solidFill>
+                  <a:schemeClr val="tx2">
+                    <a:lumMod val="50000"/>
+                  </a:schemeClr>
+                </a:solidFill>
+                <a:latin typeface="G마켓 산스 Medium"/>
+                <a:ea typeface="G마켓 산스 Medium"/>
+              </a:rPr>
+              <a:t>회원가입 버튼 클릭 시 가입 불가 </a:t>
+            </a:r>
+            <a:r>
+              <a:rPr lang="en-US" altLang="ko-KR" sz="900" dirty="0" smtClean="0">
+                <a:solidFill>
+                  <a:schemeClr val="tx2">
+                    <a:lumMod val="50000"/>
+                  </a:schemeClr>
+                </a:solidFill>
+                <a:latin typeface="G마켓 산스 Medium"/>
+                <a:ea typeface="G마켓 산스 Medium"/>
+              </a:rPr>
+              <a:t>Alert </a:t>
+            </a:r>
+            <a:r>
+              <a:rPr lang="ko-KR" altLang="en-US" sz="900" dirty="0" smtClean="0">
+                <a:solidFill>
+                  <a:schemeClr val="tx2">
+                    <a:lumMod val="50000"/>
+                  </a:schemeClr>
+                </a:solidFill>
+                <a:latin typeface="G마켓 산스 Medium"/>
+                <a:ea typeface="G마켓 산스 Medium"/>
+              </a:rPr>
+              <a:t>삽입</a:t>
+            </a:r>
+            <a:r>
+              <a:rPr lang="en-US" altLang="ko-KR" sz="900" dirty="0" smtClean="0">
+                <a:solidFill>
+                  <a:schemeClr val="tx2">
+                    <a:lumMod val="50000"/>
+                  </a:schemeClr>
+                </a:solidFill>
+                <a:latin typeface="G마켓 산스 Medium"/>
+                <a:ea typeface="G마켓 산스 Medium"/>
+              </a:rPr>
+              <a:t>.</a:t>
+            </a:r>
+            <a:endParaRPr lang="en-US" altLang="ko-KR" sz="900" dirty="0">
               <a:solidFill>
                 <a:schemeClr val="tx2">
                   <a:lumMod val="50000"/>
@@ -7752,8 +7720,8 @@
         </p:nvSpPr>
         <p:spPr>
           <a:xfrm>
-            <a:off x="8100391" y="195486"/>
-            <a:ext cx="865944" cy="200055"/>
+            <a:off x="8007418" y="195486"/>
+            <a:ext cx="958917" cy="200055"/>
           </a:xfrm>
           <a:prstGeom prst="rect">
             <a:avLst/>
@@ -7770,7 +7738,7 @@
               <a:defRPr lang="ko-KR" altLang="en-US"/>
             </a:pPr>
             <a:r>
-              <a:rPr lang="en-US" altLang="ko-KR" sz="700">
+              <a:rPr lang="ko-KR" altLang="en-US" sz="700" dirty="0" smtClean="0">
                 <a:solidFill>
                   <a:schemeClr val="tx2">
                     <a:lumMod val="60000"/>
@@ -7780,10 +7748,10 @@
                 <a:latin typeface="G마켓 산스 Medium"/>
                 <a:ea typeface="G마켓 산스 Medium"/>
               </a:rPr>
-              <a:t>#1 </a:t>
-            </a:r>
-            <a:r>
-              <a:rPr lang="ko-KR" altLang="en-US" sz="700">
+              <a:t>화면 구현 </a:t>
+            </a:r>
+            <a:r>
+              <a:rPr lang="en-US" altLang="ko-KR" sz="700" dirty="0" smtClean="0">
                 <a:solidFill>
                   <a:schemeClr val="tx2">
                     <a:lumMod val="60000"/>
@@ -7793,9 +7761,9 @@
                 <a:latin typeface="G마켓 산스 Medium"/>
                 <a:ea typeface="G마켓 산스 Medium"/>
               </a:rPr>
-              <a:t>프로젝트 제목</a:t>
-            </a:r>
-            <a:endParaRPr lang="en-US" altLang="ko-KR" sz="700">
+              <a:t>Portfolio</a:t>
+            </a:r>
+            <a:endParaRPr lang="en-US" altLang="ko-KR" sz="700" dirty="0">
               <a:solidFill>
                 <a:schemeClr val="tx2">
                   <a:lumMod val="60000"/>
@@ -7804,6 +7772,229 @@
               </a:solidFill>
               <a:latin typeface="G마켓 산스 Medium"/>
               <a:ea typeface="G마켓 산스 Medium"/>
+            </a:endParaRPr>
+          </a:p>
+        </p:txBody>
+      </p:sp>
+      <p:sp>
+        <p:nvSpPr>
+          <p:cNvPr id="18" name="직사각형 17"/>
+          <p:cNvSpPr/>
+          <p:nvPr/>
+        </p:nvSpPr>
+        <p:spPr>
+          <a:xfrm>
+            <a:off x="3733055" y="3785808"/>
+            <a:ext cx="1790925" cy="956153"/>
+          </a:xfrm>
+          <a:prstGeom prst="rect">
+            <a:avLst/>
+          </a:prstGeom>
+          <a:blipFill dpi="0" rotWithShape="1">
+            <a:blip r:embed="rId3" cstate="print">
+              <a:extLst>
+                <a:ext uri="{28A0092B-C50C-407E-A947-70E740481C1C}">
+                  <a14:useLocalDpi xmlns:a14="http://schemas.microsoft.com/office/drawing/2010/main" val="0"/>
+                </a:ext>
+              </a:extLst>
+            </a:blip>
+            <a:srcRect/>
+            <a:stretch>
+              <a:fillRect/>
+            </a:stretch>
+          </a:blipFill>
+          <a:ln>
+            <a:noFill/>
+          </a:ln>
+        </p:spPr>
+        <p:style>
+          <a:lnRef idx="2">
+            <a:schemeClr val="accent1">
+              <a:shade val="50000"/>
+            </a:schemeClr>
+          </a:lnRef>
+          <a:fillRef idx="1">
+            <a:schemeClr val="accent1"/>
+          </a:fillRef>
+          <a:effectRef idx="0">
+            <a:schemeClr val="accent1"/>
+          </a:effectRef>
+          <a:fontRef idx="minor">
+            <a:schemeClr val="lt1"/>
+          </a:fontRef>
+        </p:style>
+        <p:txBody>
+          <a:bodyPr rtlCol="0" anchor="ctr"/>
+          <a:lstStyle/>
+          <a:p>
+            <a:pPr algn="ctr"/>
+            <a:endParaRPr lang="ko-KR" altLang="en-US" dirty="0"/>
+          </a:p>
+        </p:txBody>
+      </p:sp>
+      <p:sp>
+        <p:nvSpPr>
+          <p:cNvPr id="19" name="TextBox 18"/>
+          <p:cNvSpPr txBox="1"/>
+          <p:nvPr/>
+        </p:nvSpPr>
+        <p:spPr>
+          <a:xfrm>
+            <a:off x="3972507" y="4712245"/>
+            <a:ext cx="1312020" cy="276999"/>
+          </a:xfrm>
+          <a:prstGeom prst="rect">
+            <a:avLst/>
+          </a:prstGeom>
+          <a:noFill/>
+        </p:spPr>
+        <p:txBody>
+          <a:bodyPr wrap="square" rtlCol="0">
+            <a:spAutoFit/>
+          </a:bodyPr>
+          <a:lstStyle/>
+          <a:p>
+            <a:pPr algn="ctr"/>
+            <a:r>
+              <a:rPr lang="ko-KR" altLang="en-US" sz="1200" dirty="0" smtClean="0">
+                <a:solidFill>
+                  <a:schemeClr val="tx2">
+                    <a:lumMod val="60000"/>
+                    <a:lumOff val="40000"/>
+                  </a:schemeClr>
+                </a:solidFill>
+                <a:latin typeface="G마켓 산스 Bold" pitchFamily="50" charset="-127"/>
+                <a:ea typeface="G마켓 산스 Bold" pitchFamily="50" charset="-127"/>
+              </a:rPr>
+              <a:t>로그인 화면</a:t>
+            </a:r>
+            <a:endParaRPr lang="en-US" altLang="ko-KR" sz="1200" dirty="0">
+              <a:solidFill>
+                <a:schemeClr val="tx2">
+                  <a:lumMod val="60000"/>
+                  <a:lumOff val="40000"/>
+                </a:schemeClr>
+              </a:solidFill>
+              <a:latin typeface="G마켓 산스 Bold" pitchFamily="50" charset="-127"/>
+              <a:ea typeface="G마켓 산스 Bold" pitchFamily="50" charset="-127"/>
+            </a:endParaRPr>
+          </a:p>
+        </p:txBody>
+      </p:sp>
+      <p:sp>
+        <p:nvSpPr>
+          <p:cNvPr id="20" name="직사각형 19"/>
+          <p:cNvSpPr/>
+          <p:nvPr/>
+        </p:nvSpPr>
+        <p:spPr>
+          <a:xfrm>
+            <a:off x="6177324" y="3785808"/>
+            <a:ext cx="1790925" cy="956153"/>
+          </a:xfrm>
+          <a:prstGeom prst="rect">
+            <a:avLst/>
+          </a:prstGeom>
+          <a:blipFill dpi="0" rotWithShape="1">
+            <a:blip r:embed="rId4" cstate="print">
+              <a:extLst>
+                <a:ext uri="{28A0092B-C50C-407E-A947-70E740481C1C}">
+                  <a14:useLocalDpi xmlns:a14="http://schemas.microsoft.com/office/drawing/2010/main" val="0"/>
+                </a:ext>
+              </a:extLst>
+            </a:blip>
+            <a:srcRect/>
+            <a:stretch>
+              <a:fillRect/>
+            </a:stretch>
+          </a:blipFill>
+          <a:ln>
+            <a:noFill/>
+          </a:ln>
+        </p:spPr>
+        <p:style>
+          <a:lnRef idx="2">
+            <a:schemeClr val="accent1">
+              <a:shade val="50000"/>
+            </a:schemeClr>
+          </a:lnRef>
+          <a:fillRef idx="1">
+            <a:schemeClr val="accent1"/>
+          </a:fillRef>
+          <a:effectRef idx="0">
+            <a:schemeClr val="accent1"/>
+          </a:effectRef>
+          <a:fontRef idx="minor">
+            <a:schemeClr val="lt1"/>
+          </a:fontRef>
+        </p:style>
+        <p:txBody>
+          <a:bodyPr rtlCol="0" anchor="ctr"/>
+          <a:lstStyle/>
+          <a:p>
+            <a:pPr algn="ctr"/>
+            <a:endParaRPr lang="ko-KR" altLang="en-US" dirty="0"/>
+          </a:p>
+        </p:txBody>
+      </p:sp>
+      <p:sp>
+        <p:nvSpPr>
+          <p:cNvPr id="21" name="TextBox 20"/>
+          <p:cNvSpPr txBox="1"/>
+          <p:nvPr/>
+        </p:nvSpPr>
+        <p:spPr>
+          <a:xfrm>
+            <a:off x="6416776" y="4712245"/>
+            <a:ext cx="1312020" cy="276999"/>
+          </a:xfrm>
+          <a:prstGeom prst="rect">
+            <a:avLst/>
+          </a:prstGeom>
+          <a:noFill/>
+        </p:spPr>
+        <p:txBody>
+          <a:bodyPr wrap="square" rtlCol="0">
+            <a:spAutoFit/>
+          </a:bodyPr>
+          <a:lstStyle/>
+          <a:p>
+            <a:pPr algn="ctr"/>
+            <a:r>
+              <a:rPr lang="ko-KR" altLang="en-US" sz="1200" dirty="0" smtClean="0">
+                <a:solidFill>
+                  <a:schemeClr val="tx2">
+                    <a:lumMod val="60000"/>
+                    <a:lumOff val="40000"/>
+                  </a:schemeClr>
+                </a:solidFill>
+                <a:latin typeface="G마켓 산스 Bold" pitchFamily="50" charset="-127"/>
+                <a:ea typeface="G마켓 산스 Bold" pitchFamily="50" charset="-127"/>
+              </a:rPr>
+              <a:t>회원가입 </a:t>
+            </a:r>
+            <a:r>
+              <a:rPr lang="en-US" altLang="ko-KR" sz="1200" dirty="0" smtClean="0">
+                <a:solidFill>
+                  <a:schemeClr val="tx2">
+                    <a:lumMod val="60000"/>
+                    <a:lumOff val="40000"/>
+                  </a:schemeClr>
+                </a:solidFill>
+                <a:latin typeface="G마켓 산스 Bold" pitchFamily="50" charset="-127"/>
+                <a:ea typeface="G마켓 산스 Bold" pitchFamily="50" charset="-127"/>
+              </a:rPr>
+              <a:t>Alert</a:t>
+            </a:r>
+            <a:endParaRPr lang="en-US" altLang="ko-KR" sz="1200" dirty="0">
+              <a:solidFill>
+                <a:schemeClr val="tx2">
+                  <a:lumMod val="60000"/>
+                  <a:lumOff val="40000"/>
+                </a:schemeClr>
+              </a:solidFill>
+              <a:latin typeface="G마켓 산스 Bold" pitchFamily="50" charset="-127"/>
+              <a:ea typeface="G마켓 산스 Bold" pitchFamily="50" charset="-127"/>
             </a:endParaRPr>
           </a:p>
         </p:txBody>

</xml_diff>